<commit_message>
BMS files updated and added
</commit_message>
<xml_diff>
--- a/CSED601 Dependable Computing/BlockchainScalabilityProblem.pptx
+++ b/CSED601 Dependable Computing/BlockchainScalabilityProblem.pptx
@@ -4,11 +4,27 @@
   <p:sldMasterIdLst>
     <p:sldMasterId id="2147483648" r:id="rId1"/>
   </p:sldMasterIdLst>
+  <p:notesMasterIdLst>
+    <p:notesMasterId r:id="rId19"/>
+  </p:notesMasterIdLst>
   <p:sldIdLst>
     <p:sldId id="256" r:id="rId2"/>
     <p:sldId id="257" r:id="rId3"/>
-    <p:sldId id="258" r:id="rId4"/>
-    <p:sldId id="259" r:id="rId5"/>
+    <p:sldId id="259" r:id="rId4"/>
+    <p:sldId id="260" r:id="rId5"/>
+    <p:sldId id="261" r:id="rId6"/>
+    <p:sldId id="262" r:id="rId7"/>
+    <p:sldId id="263" r:id="rId8"/>
+    <p:sldId id="264" r:id="rId9"/>
+    <p:sldId id="267" r:id="rId10"/>
+    <p:sldId id="268" r:id="rId11"/>
+    <p:sldId id="265" r:id="rId12"/>
+    <p:sldId id="266" r:id="rId13"/>
+    <p:sldId id="273" r:id="rId14"/>
+    <p:sldId id="270" r:id="rId15"/>
+    <p:sldId id="271" r:id="rId16"/>
+    <p:sldId id="272" r:id="rId17"/>
+    <p:sldId id="274" r:id="rId18"/>
   </p:sldIdLst>
   <p:sldSz cx="12192000" cy="6858000"/>
   <p:notesSz cx="6858000" cy="9144000"/>
@@ -107,7 +123,596 @@
       </a:defRPr>
     </a:lvl9pPr>
   </p:defaultTextStyle>
+  <p:extLst>
+    <p:ext uri="{EFAFB233-063F-42B5-8137-9DF3F51BA10A}">
+      <p15:sldGuideLst xmlns:p15="http://schemas.microsoft.com/office/powerpoint/2012/main"/>
+    </p:ext>
+  </p:extLst>
 </p:presentation>
+</file>
+
+<file path=ppt/notesMasters/notesMaster1.xml><?xml version="1.0" encoding="utf-8"?>
+<p:notesMaster xmlns:a="http://schemas.openxmlformats.org/drawingml/2006/main" xmlns:r="http://schemas.openxmlformats.org/officeDocument/2006/relationships" xmlns:p="http://schemas.openxmlformats.org/presentationml/2006/main">
+  <p:cSld>
+    <p:bg>
+      <p:bgRef idx="1001">
+        <a:schemeClr val="bg1"/>
+      </p:bgRef>
+    </p:bg>
+    <p:spTree>
+      <p:nvGrpSpPr>
+        <p:cNvPr id="1" name=""/>
+        <p:cNvGrpSpPr/>
+        <p:nvPr/>
+      </p:nvGrpSpPr>
+      <p:grpSpPr>
+        <a:xfrm>
+          <a:off x="0" y="0"/>
+          <a:ext cx="0" cy="0"/>
+          <a:chOff x="0" y="0"/>
+          <a:chExt cx="0" cy="0"/>
+        </a:xfrm>
+      </p:grpSpPr>
+      <p:sp>
+        <p:nvSpPr>
+          <p:cNvPr id="2" name="Header Placeholder 1"/>
+          <p:cNvSpPr>
+            <a:spLocks noGrp="1"/>
+          </p:cNvSpPr>
+          <p:nvPr>
+            <p:ph type="hdr" sz="quarter"/>
+          </p:nvPr>
+        </p:nvSpPr>
+        <p:spPr>
+          <a:xfrm>
+            <a:off x="0" y="0"/>
+            <a:ext cx="2971800" cy="458788"/>
+          </a:xfrm>
+          <a:prstGeom prst="rect">
+            <a:avLst/>
+          </a:prstGeom>
+        </p:spPr>
+        <p:txBody>
+          <a:bodyPr vert="horz" lIns="91440" tIns="45720" rIns="91440" bIns="45720" rtlCol="0"/>
+          <a:lstStyle>
+            <a:lvl1pPr algn="l">
+              <a:defRPr sz="1200"/>
+            </a:lvl1pPr>
+          </a:lstStyle>
+          <a:p>
+            <a:endParaRPr lang="en-US"/>
+          </a:p>
+        </p:txBody>
+      </p:sp>
+      <p:sp>
+        <p:nvSpPr>
+          <p:cNvPr id="3" name="Date Placeholder 2"/>
+          <p:cNvSpPr>
+            <a:spLocks noGrp="1"/>
+          </p:cNvSpPr>
+          <p:nvPr>
+            <p:ph type="dt" idx="1"/>
+          </p:nvPr>
+        </p:nvSpPr>
+        <p:spPr>
+          <a:xfrm>
+            <a:off x="3884613" y="0"/>
+            <a:ext cx="2971800" cy="458788"/>
+          </a:xfrm>
+          <a:prstGeom prst="rect">
+            <a:avLst/>
+          </a:prstGeom>
+        </p:spPr>
+        <p:txBody>
+          <a:bodyPr vert="horz" lIns="91440" tIns="45720" rIns="91440" bIns="45720" rtlCol="0"/>
+          <a:lstStyle>
+            <a:lvl1pPr algn="r">
+              <a:defRPr sz="1200"/>
+            </a:lvl1pPr>
+          </a:lstStyle>
+          <a:p>
+            <a:fld id="{AFF2E32B-9C91-4AE5-8DC9-9319F2139427}" type="datetimeFigureOut">
+              <a:rPr lang="en-US" smtClean="0"/>
+              <a:t>11/27/2018</a:t>
+            </a:fld>
+            <a:endParaRPr lang="en-US"/>
+          </a:p>
+        </p:txBody>
+      </p:sp>
+      <p:sp>
+        <p:nvSpPr>
+          <p:cNvPr id="4" name="Slide Image Placeholder 3"/>
+          <p:cNvSpPr>
+            <a:spLocks noGrp="1" noRot="1" noChangeAspect="1"/>
+          </p:cNvSpPr>
+          <p:nvPr>
+            <p:ph type="sldImg" idx="2"/>
+          </p:nvPr>
+        </p:nvSpPr>
+        <p:spPr>
+          <a:xfrm>
+            <a:off x="685800" y="1143000"/>
+            <a:ext cx="5486400" cy="3086100"/>
+          </a:xfrm>
+          <a:prstGeom prst="rect">
+            <a:avLst/>
+          </a:prstGeom>
+          <a:noFill/>
+          <a:ln w="12700">
+            <a:solidFill>
+              <a:prstClr val="black"/>
+            </a:solidFill>
+          </a:ln>
+        </p:spPr>
+        <p:txBody>
+          <a:bodyPr vert="horz" lIns="91440" tIns="45720" rIns="91440" bIns="45720" rtlCol="0" anchor="ctr"/>
+          <a:lstStyle/>
+          <a:p>
+            <a:endParaRPr lang="en-US"/>
+          </a:p>
+        </p:txBody>
+      </p:sp>
+      <p:sp>
+        <p:nvSpPr>
+          <p:cNvPr id="5" name="Notes Placeholder 4"/>
+          <p:cNvSpPr>
+            <a:spLocks noGrp="1"/>
+          </p:cNvSpPr>
+          <p:nvPr>
+            <p:ph type="body" sz="quarter" idx="3"/>
+          </p:nvPr>
+        </p:nvSpPr>
+        <p:spPr>
+          <a:xfrm>
+            <a:off x="685800" y="4400550"/>
+            <a:ext cx="5486400" cy="3600450"/>
+          </a:xfrm>
+          <a:prstGeom prst="rect">
+            <a:avLst/>
+          </a:prstGeom>
+        </p:spPr>
+        <p:txBody>
+          <a:bodyPr vert="horz" lIns="91440" tIns="45720" rIns="91440" bIns="45720" rtlCol="0"/>
+          <a:lstStyle/>
+          <a:p>
+            <a:pPr lvl="0"/>
+            <a:r>
+              <a:rPr lang="en-US" smtClean="0"/>
+              <a:t>Edit Master text styles</a:t>
+            </a:r>
+          </a:p>
+          <a:p>
+            <a:pPr lvl="1"/>
+            <a:r>
+              <a:rPr lang="en-US" smtClean="0"/>
+              <a:t>Second level</a:t>
+            </a:r>
+          </a:p>
+          <a:p>
+            <a:pPr lvl="2"/>
+            <a:r>
+              <a:rPr lang="en-US" smtClean="0"/>
+              <a:t>Third level</a:t>
+            </a:r>
+          </a:p>
+          <a:p>
+            <a:pPr lvl="3"/>
+            <a:r>
+              <a:rPr lang="en-US" smtClean="0"/>
+              <a:t>Fourth level</a:t>
+            </a:r>
+          </a:p>
+          <a:p>
+            <a:pPr lvl="4"/>
+            <a:r>
+              <a:rPr lang="en-US" smtClean="0"/>
+              <a:t>Fifth level</a:t>
+            </a:r>
+            <a:endParaRPr lang="en-US"/>
+          </a:p>
+        </p:txBody>
+      </p:sp>
+      <p:sp>
+        <p:nvSpPr>
+          <p:cNvPr id="6" name="Footer Placeholder 5"/>
+          <p:cNvSpPr>
+            <a:spLocks noGrp="1"/>
+          </p:cNvSpPr>
+          <p:nvPr>
+            <p:ph type="ftr" sz="quarter" idx="4"/>
+          </p:nvPr>
+        </p:nvSpPr>
+        <p:spPr>
+          <a:xfrm>
+            <a:off x="0" y="8685213"/>
+            <a:ext cx="2971800" cy="458787"/>
+          </a:xfrm>
+          <a:prstGeom prst="rect">
+            <a:avLst/>
+          </a:prstGeom>
+        </p:spPr>
+        <p:txBody>
+          <a:bodyPr vert="horz" lIns="91440" tIns="45720" rIns="91440" bIns="45720" rtlCol="0" anchor="b"/>
+          <a:lstStyle>
+            <a:lvl1pPr algn="l">
+              <a:defRPr sz="1200"/>
+            </a:lvl1pPr>
+          </a:lstStyle>
+          <a:p>
+            <a:endParaRPr lang="en-US"/>
+          </a:p>
+        </p:txBody>
+      </p:sp>
+      <p:sp>
+        <p:nvSpPr>
+          <p:cNvPr id="7" name="Slide Number Placeholder 6"/>
+          <p:cNvSpPr>
+            <a:spLocks noGrp="1"/>
+          </p:cNvSpPr>
+          <p:nvPr>
+            <p:ph type="sldNum" sz="quarter" idx="5"/>
+          </p:nvPr>
+        </p:nvSpPr>
+        <p:spPr>
+          <a:xfrm>
+            <a:off x="3884613" y="8685213"/>
+            <a:ext cx="2971800" cy="458787"/>
+          </a:xfrm>
+          <a:prstGeom prst="rect">
+            <a:avLst/>
+          </a:prstGeom>
+        </p:spPr>
+        <p:txBody>
+          <a:bodyPr vert="horz" lIns="91440" tIns="45720" rIns="91440" bIns="45720" rtlCol="0" anchor="b"/>
+          <a:lstStyle>
+            <a:lvl1pPr algn="r">
+              <a:defRPr sz="1200"/>
+            </a:lvl1pPr>
+          </a:lstStyle>
+          <a:p>
+            <a:fld id="{9CA391E9-CB9D-4AE8-AE8B-14ECB4B4AE91}" type="slidenum">
+              <a:rPr lang="en-US" smtClean="0"/>
+              <a:t>‹#›</a:t>
+            </a:fld>
+            <a:endParaRPr lang="en-US"/>
+          </a:p>
+        </p:txBody>
+      </p:sp>
+    </p:spTree>
+    <p:extLst>
+      <p:ext uri="{BB962C8B-B14F-4D97-AF65-F5344CB8AC3E}">
+        <p14:creationId xmlns:p14="http://schemas.microsoft.com/office/powerpoint/2010/main" val="858406335"/>
+      </p:ext>
+    </p:extLst>
+  </p:cSld>
+  <p:clrMap bg1="lt1" tx1="dk1" bg2="lt2" tx2="dk2" accent1="accent1" accent2="accent2" accent3="accent3" accent4="accent4" accent5="accent5" accent6="accent6" hlink="hlink" folHlink="folHlink"/>
+  <p:notesStyle>
+    <a:lvl1pPr marL="0" algn="l" defTabSz="914400" rtl="0" eaLnBrk="1" latinLnBrk="0" hangingPunct="1">
+      <a:defRPr sz="1200" kern="1200">
+        <a:solidFill>
+          <a:schemeClr val="tx1"/>
+        </a:solidFill>
+        <a:latin typeface="+mn-lt"/>
+        <a:ea typeface="+mn-ea"/>
+        <a:cs typeface="+mn-cs"/>
+      </a:defRPr>
+    </a:lvl1pPr>
+    <a:lvl2pPr marL="457200" algn="l" defTabSz="914400" rtl="0" eaLnBrk="1" latinLnBrk="0" hangingPunct="1">
+      <a:defRPr sz="1200" kern="1200">
+        <a:solidFill>
+          <a:schemeClr val="tx1"/>
+        </a:solidFill>
+        <a:latin typeface="+mn-lt"/>
+        <a:ea typeface="+mn-ea"/>
+        <a:cs typeface="+mn-cs"/>
+      </a:defRPr>
+    </a:lvl2pPr>
+    <a:lvl3pPr marL="914400" algn="l" defTabSz="914400" rtl="0" eaLnBrk="1" latinLnBrk="0" hangingPunct="1">
+      <a:defRPr sz="1200" kern="1200">
+        <a:solidFill>
+          <a:schemeClr val="tx1"/>
+        </a:solidFill>
+        <a:latin typeface="+mn-lt"/>
+        <a:ea typeface="+mn-ea"/>
+        <a:cs typeface="+mn-cs"/>
+      </a:defRPr>
+    </a:lvl3pPr>
+    <a:lvl4pPr marL="1371600" algn="l" defTabSz="914400" rtl="0" eaLnBrk="1" latinLnBrk="0" hangingPunct="1">
+      <a:defRPr sz="1200" kern="1200">
+        <a:solidFill>
+          <a:schemeClr val="tx1"/>
+        </a:solidFill>
+        <a:latin typeface="+mn-lt"/>
+        <a:ea typeface="+mn-ea"/>
+        <a:cs typeface="+mn-cs"/>
+      </a:defRPr>
+    </a:lvl4pPr>
+    <a:lvl5pPr marL="1828800" algn="l" defTabSz="914400" rtl="0" eaLnBrk="1" latinLnBrk="0" hangingPunct="1">
+      <a:defRPr sz="1200" kern="1200">
+        <a:solidFill>
+          <a:schemeClr val="tx1"/>
+        </a:solidFill>
+        <a:latin typeface="+mn-lt"/>
+        <a:ea typeface="+mn-ea"/>
+        <a:cs typeface="+mn-cs"/>
+      </a:defRPr>
+    </a:lvl5pPr>
+    <a:lvl6pPr marL="2286000" algn="l" defTabSz="914400" rtl="0" eaLnBrk="1" latinLnBrk="0" hangingPunct="1">
+      <a:defRPr sz="1200" kern="1200">
+        <a:solidFill>
+          <a:schemeClr val="tx1"/>
+        </a:solidFill>
+        <a:latin typeface="+mn-lt"/>
+        <a:ea typeface="+mn-ea"/>
+        <a:cs typeface="+mn-cs"/>
+      </a:defRPr>
+    </a:lvl6pPr>
+    <a:lvl7pPr marL="2743200" algn="l" defTabSz="914400" rtl="0" eaLnBrk="1" latinLnBrk="0" hangingPunct="1">
+      <a:defRPr sz="1200" kern="1200">
+        <a:solidFill>
+          <a:schemeClr val="tx1"/>
+        </a:solidFill>
+        <a:latin typeface="+mn-lt"/>
+        <a:ea typeface="+mn-ea"/>
+        <a:cs typeface="+mn-cs"/>
+      </a:defRPr>
+    </a:lvl7pPr>
+    <a:lvl8pPr marL="3200400" algn="l" defTabSz="914400" rtl="0" eaLnBrk="1" latinLnBrk="0" hangingPunct="1">
+      <a:defRPr sz="1200" kern="1200">
+        <a:solidFill>
+          <a:schemeClr val="tx1"/>
+        </a:solidFill>
+        <a:latin typeface="+mn-lt"/>
+        <a:ea typeface="+mn-ea"/>
+        <a:cs typeface="+mn-cs"/>
+      </a:defRPr>
+    </a:lvl8pPr>
+    <a:lvl9pPr marL="3657600" algn="l" defTabSz="914400" rtl="0" eaLnBrk="1" latinLnBrk="0" hangingPunct="1">
+      <a:defRPr sz="1200" kern="1200">
+        <a:solidFill>
+          <a:schemeClr val="tx1"/>
+        </a:solidFill>
+        <a:latin typeface="+mn-lt"/>
+        <a:ea typeface="+mn-ea"/>
+        <a:cs typeface="+mn-cs"/>
+      </a:defRPr>
+    </a:lvl9pPr>
+  </p:notesStyle>
+</p:notesMaster>
+</file>
+
+<file path=ppt/notesSlides/notesSlide1.xml><?xml version="1.0" encoding="utf-8"?>
+<p:notes xmlns:a="http://schemas.openxmlformats.org/drawingml/2006/main" xmlns:r="http://schemas.openxmlformats.org/officeDocument/2006/relationships" xmlns:p="http://schemas.openxmlformats.org/presentationml/2006/main">
+  <p:cSld>
+    <p:spTree>
+      <p:nvGrpSpPr>
+        <p:cNvPr id="1" name=""/>
+        <p:cNvGrpSpPr/>
+        <p:nvPr/>
+      </p:nvGrpSpPr>
+      <p:grpSpPr>
+        <a:xfrm>
+          <a:off x="0" y="0"/>
+          <a:ext cx="0" cy="0"/>
+          <a:chOff x="0" y="0"/>
+          <a:chExt cx="0" cy="0"/>
+        </a:xfrm>
+      </p:grpSpPr>
+      <p:sp>
+        <p:nvSpPr>
+          <p:cNvPr id="2" name="Slide Image Placeholder 1"/>
+          <p:cNvSpPr>
+            <a:spLocks noGrp="1" noRot="1" noChangeAspect="1"/>
+          </p:cNvSpPr>
+          <p:nvPr>
+            <p:ph type="sldImg"/>
+          </p:nvPr>
+        </p:nvSpPr>
+        <p:spPr/>
+      </p:sp>
+      <p:sp>
+        <p:nvSpPr>
+          <p:cNvPr id="3" name="Notes Placeholder 2"/>
+          <p:cNvSpPr>
+            <a:spLocks noGrp="1"/>
+          </p:cNvSpPr>
+          <p:nvPr>
+            <p:ph type="body" idx="1"/>
+          </p:nvPr>
+        </p:nvSpPr>
+        <p:spPr/>
+        <p:txBody>
+          <a:bodyPr/>
+          <a:lstStyle/>
+          <a:p>
+            <a:r>
+              <a:rPr lang="en-US" dirty="0" smtClean="0"/>
+              <a:t>Now, this may look very impressive, but here is the thing, the initial design of </a:t>
+            </a:r>
+            <a:r>
+              <a:rPr lang="en-US" dirty="0" smtClean="0">
+                <a:hlinkClick r:id="rId3"/>
+              </a:rPr>
+              <a:t>cryptocurrencies</a:t>
+            </a:r>
+            <a:r>
+              <a:rPr lang="en-US" dirty="0" smtClean="0"/>
+              <a:t> was not meant for widespread use and adaptation. While it was manageable when the number of transactions was less, as they have gotten more popular a host of issues have come up.</a:t>
+            </a:r>
+            <a:endParaRPr lang="en-US" dirty="0"/>
+          </a:p>
+        </p:txBody>
+      </p:sp>
+      <p:sp>
+        <p:nvSpPr>
+          <p:cNvPr id="4" name="Slide Number Placeholder 3"/>
+          <p:cNvSpPr>
+            <a:spLocks noGrp="1"/>
+          </p:cNvSpPr>
+          <p:nvPr>
+            <p:ph type="sldNum" sz="quarter" idx="10"/>
+          </p:nvPr>
+        </p:nvSpPr>
+        <p:spPr/>
+        <p:txBody>
+          <a:bodyPr/>
+          <a:lstStyle/>
+          <a:p>
+            <a:fld id="{9CA391E9-CB9D-4AE8-AE8B-14ECB4B4AE91}" type="slidenum">
+              <a:rPr lang="en-US" smtClean="0"/>
+              <a:t>3</a:t>
+            </a:fld>
+            <a:endParaRPr lang="en-US"/>
+          </a:p>
+        </p:txBody>
+      </p:sp>
+    </p:spTree>
+    <p:extLst>
+      <p:ext uri="{BB962C8B-B14F-4D97-AF65-F5344CB8AC3E}">
+        <p14:creationId xmlns:p14="http://schemas.microsoft.com/office/powerpoint/2010/main" val="4060738315"/>
+      </p:ext>
+    </p:extLst>
+  </p:cSld>
+  <p:clrMapOvr>
+    <a:masterClrMapping/>
+  </p:clrMapOvr>
+</p:notes>
+</file>
+
+<file path=ppt/notesSlides/notesSlide2.xml><?xml version="1.0" encoding="utf-8"?>
+<p:notes xmlns:a="http://schemas.openxmlformats.org/drawingml/2006/main" xmlns:r="http://schemas.openxmlformats.org/officeDocument/2006/relationships" xmlns:p="http://schemas.openxmlformats.org/presentationml/2006/main">
+  <p:cSld>
+    <p:spTree>
+      <p:nvGrpSpPr>
+        <p:cNvPr id="1" name=""/>
+        <p:cNvGrpSpPr/>
+        <p:nvPr/>
+      </p:nvGrpSpPr>
+      <p:grpSpPr>
+        <a:xfrm>
+          <a:off x="0" y="0"/>
+          <a:ext cx="0" cy="0"/>
+          <a:chOff x="0" y="0"/>
+          <a:chExt cx="0" cy="0"/>
+        </a:xfrm>
+      </p:grpSpPr>
+      <p:sp>
+        <p:nvSpPr>
+          <p:cNvPr id="2" name="Slide Image Placeholder 1"/>
+          <p:cNvSpPr>
+            <a:spLocks noGrp="1" noRot="1" noChangeAspect="1"/>
+          </p:cNvSpPr>
+          <p:nvPr>
+            <p:ph type="sldImg"/>
+          </p:nvPr>
+        </p:nvSpPr>
+        <p:spPr/>
+      </p:sp>
+      <p:sp>
+        <p:nvSpPr>
+          <p:cNvPr id="3" name="Notes Placeholder 2"/>
+          <p:cNvSpPr>
+            <a:spLocks noGrp="1"/>
+          </p:cNvSpPr>
+          <p:nvPr>
+            <p:ph type="body" idx="1"/>
+          </p:nvPr>
+        </p:nvSpPr>
+        <p:spPr/>
+        <p:txBody>
+          <a:bodyPr/>
+          <a:lstStyle/>
+          <a:p>
+            <a:r>
+              <a:rPr lang="en-US" dirty="0" smtClean="0"/>
+              <a:t>You take a snapshot of the actual state of </a:t>
+            </a:r>
+            <a:r>
+              <a:rPr lang="en-US" dirty="0" err="1" smtClean="0"/>
+              <a:t>ethereum</a:t>
+            </a:r>
+            <a:r>
+              <a:rPr lang="en-US" dirty="0" smtClean="0"/>
+              <a:t> </a:t>
+            </a:r>
+            <a:r>
+              <a:rPr lang="en-US" dirty="0" err="1" smtClean="0"/>
+              <a:t>blockchain</a:t>
+            </a:r>
+            <a:r>
+              <a:rPr lang="en-US" dirty="0" smtClean="0"/>
+              <a:t>, then you work with your assets/tokens on sidechain in order to decongest </a:t>
+            </a:r>
+            <a:r>
+              <a:rPr lang="en-US" dirty="0" err="1" smtClean="0"/>
+              <a:t>ethereum</a:t>
+            </a:r>
+            <a:r>
+              <a:rPr lang="en-US" dirty="0" smtClean="0"/>
+              <a:t> net. So, block validation is done on sidechain, not in the </a:t>
+            </a:r>
+            <a:r>
+              <a:rPr lang="en-US" dirty="0" err="1" smtClean="0"/>
+              <a:t>ethereum</a:t>
+            </a:r>
+            <a:r>
+              <a:rPr lang="en-US" dirty="0" smtClean="0"/>
+              <a:t> net. Therefore, Sidechain takes all the work and at some point in time the sidechain give its state to </a:t>
+            </a:r>
+            <a:r>
+              <a:rPr lang="en-US" dirty="0" err="1" smtClean="0"/>
+              <a:t>ethereum</a:t>
+            </a:r>
+            <a:r>
+              <a:rPr lang="en-US" dirty="0" smtClean="0"/>
+              <a:t> network so the </a:t>
+            </a:r>
+            <a:r>
+              <a:rPr lang="en-US" dirty="0" err="1" smtClean="0"/>
+              <a:t>prious</a:t>
+            </a:r>
+            <a:r>
+              <a:rPr lang="en-US" dirty="0" smtClean="0"/>
+              <a:t> state can be update with the current state.</a:t>
+            </a:r>
+            <a:endParaRPr lang="en-US" dirty="0"/>
+          </a:p>
+        </p:txBody>
+      </p:sp>
+      <p:sp>
+        <p:nvSpPr>
+          <p:cNvPr id="4" name="Slide Number Placeholder 3"/>
+          <p:cNvSpPr>
+            <a:spLocks noGrp="1"/>
+          </p:cNvSpPr>
+          <p:nvPr>
+            <p:ph type="sldNum" sz="quarter" idx="10"/>
+          </p:nvPr>
+        </p:nvSpPr>
+        <p:spPr/>
+        <p:txBody>
+          <a:bodyPr/>
+          <a:lstStyle/>
+          <a:p>
+            <a:fld id="{9CA391E9-CB9D-4AE8-AE8B-14ECB4B4AE91}" type="slidenum">
+              <a:rPr lang="en-US" smtClean="0"/>
+              <a:t>12</a:t>
+            </a:fld>
+            <a:endParaRPr lang="en-US"/>
+          </a:p>
+        </p:txBody>
+      </p:sp>
+    </p:spTree>
+    <p:extLst>
+      <p:ext uri="{BB962C8B-B14F-4D97-AF65-F5344CB8AC3E}">
+        <p14:creationId xmlns:p14="http://schemas.microsoft.com/office/powerpoint/2010/main" val="867404071"/>
+      </p:ext>
+    </p:extLst>
+  </p:cSld>
+  <p:clrMapOvr>
+    <a:masterClrMapping/>
+  </p:clrMapOvr>
+</p:notes>
 </file>
 
 <file path=ppt/slideLayouts/slideLayout1.xml><?xml version="1.0" encoding="utf-8"?>
@@ -241,7 +846,7 @@
           <a:p>
             <a:fld id="{6C1552E6-C12C-471C-9842-49996EAB21F7}" type="datetimeFigureOut">
               <a:rPr lang="en-US" smtClean="0"/>
-              <a:t>11/24/2018</a:t>
+              <a:t>11/27/2018</a:t>
             </a:fld>
             <a:endParaRPr lang="en-US"/>
           </a:p>
@@ -411,7 +1016,7 @@
           <a:p>
             <a:fld id="{6C1552E6-C12C-471C-9842-49996EAB21F7}" type="datetimeFigureOut">
               <a:rPr lang="en-US" smtClean="0"/>
-              <a:t>11/24/2018</a:t>
+              <a:t>11/27/2018</a:t>
             </a:fld>
             <a:endParaRPr lang="en-US"/>
           </a:p>
@@ -591,7 +1196,7 @@
           <a:p>
             <a:fld id="{6C1552E6-C12C-471C-9842-49996EAB21F7}" type="datetimeFigureOut">
               <a:rPr lang="en-US" smtClean="0"/>
-              <a:t>11/24/2018</a:t>
+              <a:t>11/27/2018</a:t>
             </a:fld>
             <a:endParaRPr lang="en-US"/>
           </a:p>
@@ -761,7 +1366,7 @@
           <a:p>
             <a:fld id="{6C1552E6-C12C-471C-9842-49996EAB21F7}" type="datetimeFigureOut">
               <a:rPr lang="en-US" smtClean="0"/>
-              <a:t>11/24/2018</a:t>
+              <a:t>11/27/2018</a:t>
             </a:fld>
             <a:endParaRPr lang="en-US"/>
           </a:p>
@@ -1007,7 +1612,7 @@
           <a:p>
             <a:fld id="{6C1552E6-C12C-471C-9842-49996EAB21F7}" type="datetimeFigureOut">
               <a:rPr lang="en-US" smtClean="0"/>
-              <a:t>11/24/2018</a:t>
+              <a:t>11/27/2018</a:t>
             </a:fld>
             <a:endParaRPr lang="en-US"/>
           </a:p>
@@ -1239,7 +1844,7 @@
           <a:p>
             <a:fld id="{6C1552E6-C12C-471C-9842-49996EAB21F7}" type="datetimeFigureOut">
               <a:rPr lang="en-US" smtClean="0"/>
-              <a:t>11/24/2018</a:t>
+              <a:t>11/27/2018</a:t>
             </a:fld>
             <a:endParaRPr lang="en-US"/>
           </a:p>
@@ -1606,7 +2211,7 @@
           <a:p>
             <a:fld id="{6C1552E6-C12C-471C-9842-49996EAB21F7}" type="datetimeFigureOut">
               <a:rPr lang="en-US" smtClean="0"/>
-              <a:t>11/24/2018</a:t>
+              <a:t>11/27/2018</a:t>
             </a:fld>
             <a:endParaRPr lang="en-US"/>
           </a:p>
@@ -1724,7 +2329,7 @@
           <a:p>
             <a:fld id="{6C1552E6-C12C-471C-9842-49996EAB21F7}" type="datetimeFigureOut">
               <a:rPr lang="en-US" smtClean="0"/>
-              <a:t>11/24/2018</a:t>
+              <a:t>11/27/2018</a:t>
             </a:fld>
             <a:endParaRPr lang="en-US"/>
           </a:p>
@@ -1819,7 +2424,7 @@
           <a:p>
             <a:fld id="{6C1552E6-C12C-471C-9842-49996EAB21F7}" type="datetimeFigureOut">
               <a:rPr lang="en-US" smtClean="0"/>
-              <a:t>11/24/2018</a:t>
+              <a:t>11/27/2018</a:t>
             </a:fld>
             <a:endParaRPr lang="en-US"/>
           </a:p>
@@ -2096,7 +2701,7 @@
           <a:p>
             <a:fld id="{6C1552E6-C12C-471C-9842-49996EAB21F7}" type="datetimeFigureOut">
               <a:rPr lang="en-US" smtClean="0"/>
-              <a:t>11/24/2018</a:t>
+              <a:t>11/27/2018</a:t>
             </a:fld>
             <a:endParaRPr lang="en-US"/>
           </a:p>
@@ -2349,7 +2954,7 @@
           <a:p>
             <a:fld id="{6C1552E6-C12C-471C-9842-49996EAB21F7}" type="datetimeFigureOut">
               <a:rPr lang="en-US" smtClean="0"/>
-              <a:t>11/24/2018</a:t>
+              <a:t>11/27/2018</a:t>
             </a:fld>
             <a:endParaRPr lang="en-US"/>
           </a:p>
@@ -2562,7 +3167,7 @@
           <a:p>
             <a:fld id="{6C1552E6-C12C-471C-9842-49996EAB21F7}" type="datetimeFigureOut">
               <a:rPr lang="en-US" smtClean="0"/>
-              <a:t>11/24/2018</a:t>
+              <a:t>11/27/2018</a:t>
             </a:fld>
             <a:endParaRPr lang="en-US"/>
           </a:p>
@@ -3060,10 +3665,17 @@
   <p:clrMapOvr>
     <a:masterClrMapping/>
   </p:clrMapOvr>
+  <p:timing>
+    <p:tnLst>
+      <p:par>
+        <p:cTn id="1" dur="indefinite" restart="never" nodeType="tmRoot"/>
+      </p:par>
+    </p:tnLst>
+  </p:timing>
 </p:sld>
 </file>
 
-<file path=ppt/slides/slide2.xml><?xml version="1.0" encoding="utf-8"?>
+<file path=ppt/slides/slide10.xml><?xml version="1.0" encoding="utf-8"?>
 <p:sld xmlns:a="http://schemas.openxmlformats.org/drawingml/2006/main" xmlns:r="http://schemas.openxmlformats.org/officeDocument/2006/relationships" xmlns:p="http://schemas.openxmlformats.org/presentationml/2006/main">
   <p:cSld>
     <p:spTree>
@@ -3096,8 +3708,24 @@
           <a:lstStyle/>
           <a:p>
             <a:r>
-              <a:rPr lang="en-US" dirty="0" smtClean="0"/>
-              <a:t>Transaction Processing Speed</a:t>
+              <a:rPr lang="en-US" dirty="0"/>
+              <a:t>Layer 1 Solutions – </a:t>
+            </a:r>
+            <a:r>
+              <a:rPr lang="en-US" dirty="0" err="1" smtClean="0"/>
+              <a:t>Sharding</a:t>
+            </a:r>
+            <a:r>
+              <a:rPr lang="en-US" dirty="0" smtClean="0"/>
+              <a:t> (</a:t>
+            </a:r>
+            <a:r>
+              <a:rPr lang="en-US" dirty="0" err="1" smtClean="0"/>
+              <a:t>contd</a:t>
+            </a:r>
+            <a:r>
+              <a:rPr lang="en-US" dirty="0" smtClean="0"/>
+              <a:t>…)</a:t>
             </a:r>
             <a:endParaRPr lang="en-US" dirty="0"/>
           </a:p>
@@ -3120,114 +3748,153 @@
           <a:p>
             <a:r>
               <a:rPr lang="en-US" dirty="0" smtClean="0"/>
-              <a:t>VISA &amp; MasterCard Payment System – 24000 TPS</a:t>
-            </a:r>
-          </a:p>
-          <a:p>
-            <a:r>
-              <a:rPr lang="en-US" dirty="0" smtClean="0"/>
-              <a:t>Bitcoin </a:t>
-            </a:r>
+              <a:t>Parallel Processing of unconnected subset of transactions</a:t>
+            </a:r>
+          </a:p>
+          <a:p>
             <a:r>
               <a:rPr lang="en-US" dirty="0" err="1" smtClean="0"/>
-              <a:t>Blockchain</a:t>
-            </a:r>
-            <a:r>
-              <a:rPr lang="en-US" dirty="0" smtClean="0"/>
-              <a:t> – 3.3 to 7 TPS</a:t>
+              <a:t>Sharding</a:t>
+            </a:r>
+            <a:r>
+              <a:rPr lang="en-US" dirty="0" smtClean="0"/>
+              <a:t> can also reduce transaction fees as nodes require less processing to validate transactions</a:t>
             </a:r>
           </a:p>
           <a:p>
             <a:r>
               <a:rPr lang="en-US" dirty="0" err="1" smtClean="0"/>
-              <a:t>Ethereum</a:t>
+              <a:t>Ziliqa</a:t>
+            </a:r>
+            <a:r>
+              <a:rPr lang="en-US" dirty="0" smtClean="0"/>
+              <a:t> is a public </a:t>
+            </a:r>
+            <a:r>
+              <a:rPr lang="en-US" dirty="0" err="1" smtClean="0"/>
+              <a:t>blockchain</a:t>
+            </a:r>
+            <a:r>
+              <a:rPr lang="en-US" dirty="0" smtClean="0"/>
+              <a:t> that uses </a:t>
+            </a:r>
+            <a:r>
+              <a:rPr lang="en-US" dirty="0" err="1" smtClean="0"/>
+              <a:t>sharding</a:t>
+            </a:r>
+            <a:r>
+              <a:rPr lang="en-US" dirty="0" smtClean="0"/>
+              <a:t> mechanism to improve transaction throughput (2500 TPS)</a:t>
+            </a:r>
+          </a:p>
+          <a:p>
+            <a:r>
+              <a:rPr lang="en-US" dirty="0" smtClean="0"/>
+              <a:t>Implementation complexity, inter shard communication complexity, security could be compromised</a:t>
+            </a:r>
+          </a:p>
+          <a:p>
+            <a:endParaRPr lang="en-US" dirty="0"/>
+          </a:p>
+        </p:txBody>
+      </p:sp>
+      <p:pic>
+        <p:nvPicPr>
+          <p:cNvPr id="4" name="Picture 3"/>
+          <p:cNvPicPr>
+            <a:picLocks noChangeAspect="1"/>
+          </p:cNvPicPr>
+          <p:nvPr/>
+        </p:nvPicPr>
+        <p:blipFill>
+          <a:blip r:embed="rId2">
+            <a:extLst>
+              <a:ext uri="{28A0092B-C50C-407E-A947-70E740481C1C}">
+                <a14:useLocalDpi xmlns:a14="http://schemas.microsoft.com/office/drawing/2010/main" val="0"/>
+              </a:ext>
+            </a:extLst>
+          </a:blip>
+          <a:stretch>
+            <a:fillRect/>
+          </a:stretch>
+        </p:blipFill>
+        <p:spPr>
+          <a:xfrm>
+            <a:off x="8305800" y="4681093"/>
+            <a:ext cx="2036064" cy="2036064"/>
+          </a:xfrm>
+          <a:prstGeom prst="rect">
+            <a:avLst/>
+          </a:prstGeom>
+        </p:spPr>
+      </p:pic>
+      <p:sp>
+        <p:nvSpPr>
+          <p:cNvPr id="5" name="TextBox 4"/>
+          <p:cNvSpPr txBox="1"/>
+          <p:nvPr/>
+        </p:nvSpPr>
+        <p:spPr>
+          <a:xfrm>
+            <a:off x="1046988" y="5699125"/>
+            <a:ext cx="7050024" cy="646331"/>
+          </a:xfrm>
+          <a:prstGeom prst="rect">
+            <a:avLst/>
+          </a:prstGeom>
+          <a:noFill/>
+        </p:spPr>
+        <p:txBody>
+          <a:bodyPr wrap="square" rtlCol="0">
+            <a:spAutoFit/>
+          </a:bodyPr>
+          <a:lstStyle/>
+          <a:p>
+            <a:r>
+              <a:rPr lang="en-US" dirty="0"/>
+              <a:t>Image Courtesy: </a:t>
+            </a:r>
+            <a:r>
+              <a:rPr lang="en-US" dirty="0">
+                <a:hlinkClick r:id="rId3"/>
+              </a:rPr>
+              <a:t>https://</a:t>
+            </a:r>
+            <a:r>
+              <a:rPr lang="en-US" dirty="0" smtClean="0">
+                <a:hlinkClick r:id="rId3"/>
+              </a:rPr>
+              <a:t>i.ebayimg.com/images/g/a2wAAOSwY6FZ3s8U/s-l300.jpg</a:t>
             </a:r>
             <a:r>
               <a:rPr lang="en-US" dirty="0" smtClean="0"/>
               <a:t> </a:t>
             </a:r>
-            <a:r>
-              <a:rPr lang="en-US" dirty="0" err="1" smtClean="0"/>
-              <a:t>Blockchain</a:t>
-            </a:r>
-            <a:r>
-              <a:rPr lang="en-US" dirty="0" smtClean="0"/>
-              <a:t> – 15 to 20 TPS</a:t>
-            </a:r>
-          </a:p>
-          <a:p>
-            <a:pPr lvl="0"/>
-            <a:r>
-              <a:rPr lang="en-US" i="1" dirty="0">
-                <a:solidFill>
-                  <a:prstClr val="black"/>
-                </a:solidFill>
-              </a:rPr>
-              <a:t>If you want to pay for a cup of coffee in Bitcoin/Ethers, are you willing to wait for an hour/few minutes for confirmation of transactions</a:t>
-            </a:r>
-            <a:r>
-              <a:rPr lang="en-US" i="1" dirty="0" smtClean="0">
-                <a:solidFill>
-                  <a:prstClr val="black"/>
-                </a:solidFill>
-              </a:rPr>
-              <a:t>?</a:t>
-            </a:r>
-          </a:p>
-          <a:p>
-            <a:pPr lvl="0"/>
-            <a:r>
-              <a:rPr lang="en-US" i="1" dirty="0" smtClean="0">
-                <a:solidFill>
-                  <a:prstClr val="black"/>
-                </a:solidFill>
-              </a:rPr>
-              <a:t>This situation can be considered as an availability (readiness for service) issue of </a:t>
-            </a:r>
-            <a:r>
-              <a:rPr lang="en-US" i="1" dirty="0" err="1" smtClean="0">
-                <a:solidFill>
-                  <a:prstClr val="black"/>
-                </a:solidFill>
-              </a:rPr>
-              <a:t>blockchain</a:t>
-            </a:r>
-            <a:r>
-              <a:rPr lang="en-US" i="1" dirty="0" smtClean="0">
-                <a:solidFill>
-                  <a:prstClr val="black"/>
-                </a:solidFill>
-              </a:rPr>
-              <a:t> networks. [Also concerns with security]</a:t>
-            </a:r>
-            <a:endParaRPr lang="en-US" i="1" dirty="0">
-              <a:solidFill>
-                <a:prstClr val="black"/>
-              </a:solidFill>
-            </a:endParaRPr>
-          </a:p>
-          <a:p>
-            <a:pPr marL="0" indent="0">
-              <a:buNone/>
-            </a:pPr>
-            <a:endParaRPr lang="en-US" dirty="0" smtClean="0"/>
+            <a:endParaRPr lang="en-US" dirty="0"/>
           </a:p>
         </p:txBody>
       </p:sp>
     </p:spTree>
     <p:extLst>
       <p:ext uri="{BB962C8B-B14F-4D97-AF65-F5344CB8AC3E}">
-        <p14:creationId xmlns:p14="http://schemas.microsoft.com/office/powerpoint/2010/main" val="3289948821"/>
+        <p14:creationId xmlns:p14="http://schemas.microsoft.com/office/powerpoint/2010/main" val="2368553485"/>
       </p:ext>
     </p:extLst>
   </p:cSld>
   <p:clrMapOvr>
     <a:masterClrMapping/>
   </p:clrMapOvr>
+  <p:timing>
+    <p:tnLst>
+      <p:par>
+        <p:cTn id="1" dur="indefinite" restart="never" nodeType="tmRoot"/>
+      </p:par>
+    </p:tnLst>
+  </p:timing>
 </p:sld>
 </file>
 
-<file path=ppt/slides/slide3.xml><?xml version="1.0" encoding="utf-8"?>
+<file path=ppt/slides/slide11.xml><?xml version="1.0" encoding="utf-8"?>
 <p:sld xmlns:a="http://schemas.openxmlformats.org/drawingml/2006/main" xmlns:r="http://schemas.openxmlformats.org/officeDocument/2006/relationships" xmlns:p="http://schemas.openxmlformats.org/presentationml/2006/main">
   <p:cSld>
     <p:spTree>
@@ -3261,6 +3928,443 @@
           <a:p>
             <a:r>
               <a:rPr lang="en-US" dirty="0" smtClean="0"/>
+              <a:t>Layer 2 Solutions – Off Chain</a:t>
+            </a:r>
+            <a:endParaRPr lang="en-US" dirty="0"/>
+          </a:p>
+        </p:txBody>
+      </p:sp>
+      <p:sp>
+        <p:nvSpPr>
+          <p:cNvPr id="3" name="Content Placeholder 2"/>
+          <p:cNvSpPr>
+            <a:spLocks noGrp="1"/>
+          </p:cNvSpPr>
+          <p:nvPr>
+            <p:ph idx="1"/>
+          </p:nvPr>
+        </p:nvSpPr>
+        <p:spPr/>
+        <p:txBody>
+          <a:bodyPr>
+            <a:normAutofit lnSpcReduction="10000"/>
+          </a:bodyPr>
+          <a:lstStyle/>
+          <a:p>
+            <a:r>
+              <a:rPr lang="en-US" dirty="0" smtClean="0"/>
+              <a:t>Cuts down data processing on the </a:t>
+            </a:r>
+            <a:r>
+              <a:rPr lang="en-US" dirty="0" err="1" smtClean="0"/>
+              <a:t>blockchain</a:t>
+            </a:r>
+            <a:r>
+              <a:rPr lang="en-US" dirty="0" smtClean="0"/>
+              <a:t> by running computations off-chain</a:t>
+            </a:r>
+          </a:p>
+          <a:p>
+            <a:r>
+              <a:rPr lang="en-US" dirty="0" smtClean="0"/>
+              <a:t>Rely on the security of the base chain</a:t>
+            </a:r>
+          </a:p>
+          <a:p>
+            <a:r>
+              <a:rPr lang="en-US" dirty="0" smtClean="0">
+                <a:solidFill>
+                  <a:srgbClr val="FF0000"/>
+                </a:solidFill>
+              </a:rPr>
+              <a:t>Record final transaction/settlement on the main chain </a:t>
+            </a:r>
+            <a:r>
+              <a:rPr lang="en-US" dirty="0" smtClean="0"/>
+              <a:t>while small transactions details are maintained off-chain</a:t>
+            </a:r>
+          </a:p>
+          <a:p>
+            <a:pPr lvl="1"/>
+            <a:r>
+              <a:rPr lang="en-US" dirty="0" smtClean="0"/>
+              <a:t>Transfer Agreement, Escrow, Coupon based payment</a:t>
+            </a:r>
+          </a:p>
+          <a:p>
+            <a:pPr lvl="1"/>
+            <a:r>
+              <a:rPr lang="en-US" dirty="0" err="1" smtClean="0"/>
+              <a:t>Eg</a:t>
+            </a:r>
+            <a:r>
+              <a:rPr lang="en-US" dirty="0" smtClean="0"/>
+              <a:t>. Rather than maintaining daily record of grocery purchase, maintain the final cumulative transaction at the end of month</a:t>
+            </a:r>
+          </a:p>
+          <a:p>
+            <a:r>
+              <a:rPr lang="en-US" dirty="0" smtClean="0"/>
+              <a:t>Off chain transactions are instantaneous</a:t>
+            </a:r>
+          </a:p>
+          <a:p>
+            <a:r>
+              <a:rPr lang="en-US" dirty="0" err="1" smtClean="0"/>
+              <a:t>Eg</a:t>
+            </a:r>
+            <a:r>
+              <a:rPr lang="en-US" dirty="0" smtClean="0"/>
+              <a:t>. Bitcoin Lightning Network, </a:t>
+            </a:r>
+            <a:r>
+              <a:rPr lang="en-US" dirty="0" err="1" smtClean="0"/>
+              <a:t>Ethereum</a:t>
+            </a:r>
+            <a:r>
+              <a:rPr lang="en-US" dirty="0" smtClean="0"/>
+              <a:t> Plasma</a:t>
+            </a:r>
+          </a:p>
+          <a:p>
+            <a:endParaRPr lang="en-US" dirty="0"/>
+          </a:p>
+        </p:txBody>
+      </p:sp>
+    </p:spTree>
+    <p:extLst>
+      <p:ext uri="{BB962C8B-B14F-4D97-AF65-F5344CB8AC3E}">
+        <p14:creationId xmlns:p14="http://schemas.microsoft.com/office/powerpoint/2010/main" val="855242863"/>
+      </p:ext>
+    </p:extLst>
+  </p:cSld>
+  <p:clrMapOvr>
+    <a:masterClrMapping/>
+  </p:clrMapOvr>
+  <p:timing>
+    <p:tnLst>
+      <p:par>
+        <p:cTn id="1" dur="indefinite" restart="never" nodeType="tmRoot"/>
+      </p:par>
+    </p:tnLst>
+  </p:timing>
+</p:sld>
+</file>
+
+<file path=ppt/slides/slide12.xml><?xml version="1.0" encoding="utf-8"?>
+<p:sld xmlns:a="http://schemas.openxmlformats.org/drawingml/2006/main" xmlns:r="http://schemas.openxmlformats.org/officeDocument/2006/relationships" xmlns:p="http://schemas.openxmlformats.org/presentationml/2006/main">
+  <p:cSld>
+    <p:spTree>
+      <p:nvGrpSpPr>
+        <p:cNvPr id="1" name=""/>
+        <p:cNvGrpSpPr/>
+        <p:nvPr/>
+      </p:nvGrpSpPr>
+      <p:grpSpPr>
+        <a:xfrm>
+          <a:off x="0" y="0"/>
+          <a:ext cx="0" cy="0"/>
+          <a:chOff x="0" y="0"/>
+          <a:chExt cx="0" cy="0"/>
+        </a:xfrm>
+      </p:grpSpPr>
+      <p:sp>
+        <p:nvSpPr>
+          <p:cNvPr id="2" name="Title 1"/>
+          <p:cNvSpPr>
+            <a:spLocks noGrp="1"/>
+          </p:cNvSpPr>
+          <p:nvPr>
+            <p:ph type="title"/>
+          </p:nvPr>
+        </p:nvSpPr>
+        <p:spPr/>
+        <p:txBody>
+          <a:bodyPr/>
+          <a:lstStyle/>
+          <a:p>
+            <a:r>
+              <a:rPr lang="en-US" dirty="0" smtClean="0"/>
+              <a:t>Layer 2 Solutions – Sidechains</a:t>
+            </a:r>
+            <a:endParaRPr lang="en-US" dirty="0"/>
+          </a:p>
+        </p:txBody>
+      </p:sp>
+      <p:sp>
+        <p:nvSpPr>
+          <p:cNvPr id="3" name="Content Placeholder 2"/>
+          <p:cNvSpPr>
+            <a:spLocks noGrp="1"/>
+          </p:cNvSpPr>
+          <p:nvPr>
+            <p:ph idx="1"/>
+          </p:nvPr>
+        </p:nvSpPr>
+        <p:spPr/>
+        <p:txBody>
+          <a:bodyPr>
+            <a:normAutofit fontScale="92500"/>
+          </a:bodyPr>
+          <a:lstStyle/>
+          <a:p>
+            <a:r>
+              <a:rPr lang="en-US" dirty="0" smtClean="0"/>
+              <a:t>A separate </a:t>
+            </a:r>
+            <a:r>
+              <a:rPr lang="en-US" dirty="0" err="1" smtClean="0"/>
+              <a:t>blockchain</a:t>
+            </a:r>
+            <a:r>
+              <a:rPr lang="en-US" dirty="0" smtClean="0"/>
+              <a:t> attached to the main chain that facilitates trading of assets both ways</a:t>
+            </a:r>
+          </a:p>
+          <a:p>
+            <a:r>
+              <a:rPr lang="en-US" dirty="0" smtClean="0"/>
+              <a:t>Sidechains are independent of main chain. Needs it own miners or block producers</a:t>
+            </a:r>
+          </a:p>
+          <a:p>
+            <a:r>
+              <a:rPr lang="en-US" dirty="0" smtClean="0"/>
+              <a:t>Sidechains run in parallel with </a:t>
+            </a:r>
+            <a:r>
+              <a:rPr lang="en-US" dirty="0" err="1" smtClean="0"/>
+              <a:t>mainnet</a:t>
+            </a:r>
+            <a:r>
+              <a:rPr lang="en-US" dirty="0" smtClean="0"/>
+              <a:t> and doesn’t boggle the main net.</a:t>
+            </a:r>
+          </a:p>
+          <a:p>
+            <a:r>
+              <a:rPr lang="en-US" dirty="0"/>
+              <a:t>People can send funds and use </a:t>
+            </a:r>
+            <a:r>
+              <a:rPr lang="en-US" dirty="0" err="1"/>
+              <a:t>DApps</a:t>
+            </a:r>
+            <a:r>
+              <a:rPr lang="en-US" dirty="0"/>
+              <a:t> through a sidechain, which takes pressure off the main-chain and allows for it to operate with faster and cheaper transactions</a:t>
+            </a:r>
+            <a:r>
+              <a:rPr lang="en-US" dirty="0" smtClean="0"/>
+              <a:t>.</a:t>
+            </a:r>
+          </a:p>
+          <a:p>
+            <a:r>
+              <a:rPr lang="en-US" dirty="0" smtClean="0"/>
+              <a:t>Sidechains can have problems of security since each sidechain is responsible for its own miners</a:t>
+            </a:r>
+          </a:p>
+          <a:p>
+            <a:endParaRPr lang="en-US" dirty="0" smtClean="0"/>
+          </a:p>
+          <a:p>
+            <a:endParaRPr lang="en-US" dirty="0" smtClean="0"/>
+          </a:p>
+          <a:p>
+            <a:endParaRPr lang="en-US" dirty="0"/>
+          </a:p>
+        </p:txBody>
+      </p:sp>
+    </p:spTree>
+    <p:extLst>
+      <p:ext uri="{BB962C8B-B14F-4D97-AF65-F5344CB8AC3E}">
+        <p14:creationId xmlns:p14="http://schemas.microsoft.com/office/powerpoint/2010/main" val="3556404456"/>
+      </p:ext>
+    </p:extLst>
+  </p:cSld>
+  <p:clrMapOvr>
+    <a:masterClrMapping/>
+  </p:clrMapOvr>
+  <p:timing>
+    <p:tnLst>
+      <p:par>
+        <p:cTn id="1" dur="indefinite" restart="never" nodeType="tmRoot"/>
+      </p:par>
+    </p:tnLst>
+  </p:timing>
+</p:sld>
+</file>
+
+<file path=ppt/slides/slide13.xml><?xml version="1.0" encoding="utf-8"?>
+<p:sld xmlns:a="http://schemas.openxmlformats.org/drawingml/2006/main" xmlns:r="http://schemas.openxmlformats.org/officeDocument/2006/relationships" xmlns:p="http://schemas.openxmlformats.org/presentationml/2006/main">
+  <p:cSld>
+    <p:spTree>
+      <p:nvGrpSpPr>
+        <p:cNvPr id="1" name=""/>
+        <p:cNvGrpSpPr/>
+        <p:nvPr/>
+      </p:nvGrpSpPr>
+      <p:grpSpPr>
+        <a:xfrm>
+          <a:off x="0" y="0"/>
+          <a:ext cx="0" cy="0"/>
+          <a:chOff x="0" y="0"/>
+          <a:chExt cx="0" cy="0"/>
+        </a:xfrm>
+      </p:grpSpPr>
+      <p:sp>
+        <p:nvSpPr>
+          <p:cNvPr id="2" name="Title 1"/>
+          <p:cNvSpPr>
+            <a:spLocks noGrp="1"/>
+          </p:cNvSpPr>
+          <p:nvPr>
+            <p:ph type="title"/>
+          </p:nvPr>
+        </p:nvSpPr>
+        <p:spPr/>
+        <p:txBody>
+          <a:bodyPr/>
+          <a:lstStyle/>
+          <a:p>
+            <a:r>
+              <a:rPr lang="en-US" dirty="0" smtClean="0"/>
+              <a:t>Layer 2 Solutions – Off-chain &amp; Sidechains</a:t>
+            </a:r>
+            <a:endParaRPr lang="en-US" dirty="0"/>
+          </a:p>
+        </p:txBody>
+      </p:sp>
+      <p:pic>
+        <p:nvPicPr>
+          <p:cNvPr id="4" name="Content Placeholder 3"/>
+          <p:cNvPicPr>
+            <a:picLocks noGrp="1" noChangeAspect="1"/>
+          </p:cNvPicPr>
+          <p:nvPr>
+            <p:ph idx="1"/>
+          </p:nvPr>
+        </p:nvPicPr>
+        <p:blipFill>
+          <a:blip r:embed="rId2">
+            <a:extLst>
+              <a:ext uri="{28A0092B-C50C-407E-A947-70E740481C1C}">
+                <a14:useLocalDpi xmlns:a14="http://schemas.microsoft.com/office/drawing/2010/main" val="0"/>
+              </a:ext>
+            </a:extLst>
+          </a:blip>
+          <a:stretch>
+            <a:fillRect/>
+          </a:stretch>
+        </p:blipFill>
+        <p:spPr>
+          <a:xfrm>
+            <a:off x="2224703" y="1825625"/>
+            <a:ext cx="6809569" cy="3826978"/>
+          </a:xfrm>
+        </p:spPr>
+      </p:pic>
+      <p:sp>
+        <p:nvSpPr>
+          <p:cNvPr id="5" name="TextBox 4"/>
+          <p:cNvSpPr txBox="1"/>
+          <p:nvPr/>
+        </p:nvSpPr>
+        <p:spPr>
+          <a:xfrm>
+            <a:off x="1392873" y="5969352"/>
+            <a:ext cx="9642448" cy="369332"/>
+          </a:xfrm>
+          <a:prstGeom prst="rect">
+            <a:avLst/>
+          </a:prstGeom>
+          <a:noFill/>
+        </p:spPr>
+        <p:txBody>
+          <a:bodyPr wrap="none" rtlCol="0">
+            <a:spAutoFit/>
+          </a:bodyPr>
+          <a:lstStyle/>
+          <a:p>
+            <a:r>
+              <a:rPr lang="en-US" dirty="0"/>
+              <a:t>Image Courtesy: </a:t>
+            </a:r>
+            <a:r>
+              <a:rPr lang="en-US" dirty="0">
+                <a:hlinkClick r:id="rId3"/>
+              </a:rPr>
+              <a:t>https://</a:t>
+            </a:r>
+            <a:r>
+              <a:rPr lang="en-US" dirty="0" smtClean="0">
+                <a:hlinkClick r:id="rId3"/>
+              </a:rPr>
+              <a:t>cdn-images-1.medium.com/max/1000/1*WO8UqDyrAN8_BT8zbLSBFQ.png</a:t>
+            </a:r>
+            <a:r>
+              <a:rPr lang="en-US" dirty="0" smtClean="0"/>
+              <a:t>  </a:t>
+            </a:r>
+            <a:endParaRPr lang="en-US" dirty="0"/>
+          </a:p>
+        </p:txBody>
+      </p:sp>
+    </p:spTree>
+    <p:extLst>
+      <p:ext uri="{BB962C8B-B14F-4D97-AF65-F5344CB8AC3E}">
+        <p14:creationId xmlns:p14="http://schemas.microsoft.com/office/powerpoint/2010/main" val="2251740501"/>
+      </p:ext>
+    </p:extLst>
+  </p:cSld>
+  <p:clrMapOvr>
+    <a:masterClrMapping/>
+  </p:clrMapOvr>
+  <p:timing>
+    <p:tnLst>
+      <p:par>
+        <p:cTn id="1" dur="indefinite" restart="never" nodeType="tmRoot"/>
+      </p:par>
+    </p:tnLst>
+  </p:timing>
+</p:sld>
+</file>
+
+<file path=ppt/slides/slide14.xml><?xml version="1.0" encoding="utf-8"?>
+<p:sld xmlns:a="http://schemas.openxmlformats.org/drawingml/2006/main" xmlns:r="http://schemas.openxmlformats.org/officeDocument/2006/relationships" xmlns:p="http://schemas.openxmlformats.org/presentationml/2006/main">
+  <p:cSld>
+    <p:spTree>
+      <p:nvGrpSpPr>
+        <p:cNvPr id="1" name=""/>
+        <p:cNvGrpSpPr/>
+        <p:nvPr/>
+      </p:nvGrpSpPr>
+      <p:grpSpPr>
+        <a:xfrm>
+          <a:off x="0" y="0"/>
+          <a:ext cx="0" cy="0"/>
+          <a:chOff x="0" y="0"/>
+          <a:chExt cx="0" cy="0"/>
+        </a:xfrm>
+      </p:grpSpPr>
+      <p:sp>
+        <p:nvSpPr>
+          <p:cNvPr id="2" name="Title 1"/>
+          <p:cNvSpPr>
+            <a:spLocks noGrp="1"/>
+          </p:cNvSpPr>
+          <p:nvPr>
+            <p:ph type="title"/>
+          </p:nvPr>
+        </p:nvSpPr>
+        <p:spPr/>
+        <p:txBody>
+          <a:bodyPr/>
+          <a:lstStyle/>
+          <a:p>
+            <a:r>
+              <a:rPr lang="en-US" dirty="0" smtClean="0"/>
               <a:t>Scalability Trilemma</a:t>
             </a:r>
             <a:endParaRPr lang="en-US" dirty="0"/>
@@ -3313,6 +4417,289 @@
               <a:rPr lang="en-US" dirty="0" smtClean="0"/>
               <a:t> without compromising any of these properties</a:t>
             </a:r>
+          </a:p>
+          <a:p>
+            <a:r>
+              <a:rPr lang="en-US" dirty="0" smtClean="0"/>
+              <a:t>Scalability solutions compromise either decentralization or security aspect</a:t>
+            </a:r>
+            <a:endParaRPr lang="en-US" dirty="0"/>
+          </a:p>
+        </p:txBody>
+      </p:sp>
+      <p:sp>
+        <p:nvSpPr>
+          <p:cNvPr id="5" name="TextBox 4"/>
+          <p:cNvSpPr txBox="1"/>
+          <p:nvPr/>
+        </p:nvSpPr>
+        <p:spPr>
+          <a:xfrm>
+            <a:off x="2816352" y="5665569"/>
+            <a:ext cx="5468112" cy="646331"/>
+          </a:xfrm>
+          <a:prstGeom prst="rect">
+            <a:avLst/>
+          </a:prstGeom>
+          <a:noFill/>
+        </p:spPr>
+        <p:txBody>
+          <a:bodyPr wrap="square" rtlCol="0">
+            <a:spAutoFit/>
+          </a:bodyPr>
+          <a:lstStyle/>
+          <a:p>
+            <a:pPr lvl="0"/>
+            <a:r>
+              <a:rPr kumimoji="0" lang="en-US" sz="1800" b="0" i="0" u="none" strike="noStrike" kern="1200" cap="none" spc="0" normalizeH="0" baseline="0" noProof="0" dirty="0" smtClean="0">
+                <a:ln>
+                  <a:noFill/>
+                </a:ln>
+                <a:solidFill>
+                  <a:prstClr val="black"/>
+                </a:solidFill>
+                <a:effectLst/>
+                <a:uLnTx/>
+                <a:uFillTx/>
+                <a:latin typeface="Calibri" panose="020F0502020204030204"/>
+                <a:ea typeface="+mn-ea"/>
+                <a:cs typeface="+mn-cs"/>
+              </a:rPr>
+              <a:t>Image </a:t>
+            </a:r>
+            <a:r>
+              <a:rPr lang="en-US" dirty="0" smtClean="0">
+                <a:solidFill>
+                  <a:prstClr val="black"/>
+                </a:solidFill>
+              </a:rPr>
+              <a:t>Courtesy- </a:t>
+            </a:r>
+            <a:r>
+              <a:rPr lang="en-US" dirty="0">
+                <a:solidFill>
+                  <a:prstClr val="black"/>
+                </a:solidFill>
+                <a:hlinkClick r:id="rId2"/>
+              </a:rPr>
+              <a:t>https://</a:t>
+            </a:r>
+            <a:r>
+              <a:rPr lang="en-US" dirty="0" smtClean="0">
+                <a:solidFill>
+                  <a:prstClr val="black"/>
+                </a:solidFill>
+                <a:hlinkClick r:id="rId2"/>
+              </a:rPr>
+              <a:t>cdn-images-1.medium.com/max/800/0*kAeB2L9FQhCCs8EE</a:t>
+            </a:r>
+            <a:r>
+              <a:rPr lang="en-US" dirty="0" smtClean="0">
+                <a:solidFill>
+                  <a:prstClr val="black"/>
+                </a:solidFill>
+              </a:rPr>
+              <a:t>  </a:t>
+            </a:r>
+            <a:endParaRPr kumimoji="0" lang="en-US" sz="1800" b="0" i="0" u="none" strike="noStrike" kern="1200" cap="none" spc="0" normalizeH="0" baseline="0" noProof="0" dirty="0">
+              <a:ln>
+                <a:noFill/>
+              </a:ln>
+              <a:solidFill>
+                <a:prstClr val="black"/>
+              </a:solidFill>
+              <a:effectLst/>
+              <a:uLnTx/>
+              <a:uFillTx/>
+              <a:latin typeface="Calibri" panose="020F0502020204030204"/>
+              <a:ea typeface="+mn-ea"/>
+              <a:cs typeface="+mn-cs"/>
+            </a:endParaRPr>
+          </a:p>
+        </p:txBody>
+      </p:sp>
+      <p:pic>
+        <p:nvPicPr>
+          <p:cNvPr id="6" name="Picture 5"/>
+          <p:cNvPicPr>
+            <a:picLocks noChangeAspect="1"/>
+          </p:cNvPicPr>
+          <p:nvPr/>
+        </p:nvPicPr>
+        <p:blipFill>
+          <a:blip r:embed="rId3">
+            <a:extLst>
+              <a:ext uri="{28A0092B-C50C-407E-A947-70E740481C1C}">
+                <a14:useLocalDpi xmlns:a14="http://schemas.microsoft.com/office/drawing/2010/main" val="0"/>
+              </a:ext>
+            </a:extLst>
+          </a:blip>
+          <a:stretch>
+            <a:fillRect/>
+          </a:stretch>
+        </p:blipFill>
+        <p:spPr>
+          <a:xfrm>
+            <a:off x="3760236" y="3611335"/>
+            <a:ext cx="2346746" cy="2054234"/>
+          </a:xfrm>
+          <a:prstGeom prst="rect">
+            <a:avLst/>
+          </a:prstGeom>
+        </p:spPr>
+      </p:pic>
+    </p:spTree>
+    <p:extLst>
+      <p:ext uri="{BB962C8B-B14F-4D97-AF65-F5344CB8AC3E}">
+        <p14:creationId xmlns:p14="http://schemas.microsoft.com/office/powerpoint/2010/main" val="2461809402"/>
+      </p:ext>
+    </p:extLst>
+  </p:cSld>
+  <p:clrMapOvr>
+    <a:masterClrMapping/>
+  </p:clrMapOvr>
+  <p:timing>
+    <p:tnLst>
+      <p:par>
+        <p:cTn id="1" dur="indefinite" restart="never" nodeType="tmRoot"/>
+      </p:par>
+    </p:tnLst>
+  </p:timing>
+</p:sld>
+</file>
+
+<file path=ppt/slides/slide15.xml><?xml version="1.0" encoding="utf-8"?>
+<p:sld xmlns:a="http://schemas.openxmlformats.org/drawingml/2006/main" xmlns:r="http://schemas.openxmlformats.org/officeDocument/2006/relationships" xmlns:p="http://schemas.openxmlformats.org/presentationml/2006/main">
+  <p:cSld>
+    <p:spTree>
+      <p:nvGrpSpPr>
+        <p:cNvPr id="1" name=""/>
+        <p:cNvGrpSpPr/>
+        <p:nvPr/>
+      </p:nvGrpSpPr>
+      <p:grpSpPr>
+        <a:xfrm>
+          <a:off x="0" y="0"/>
+          <a:ext cx="0" cy="0"/>
+          <a:chOff x="0" y="0"/>
+          <a:chExt cx="0" cy="0"/>
+        </a:xfrm>
+      </p:grpSpPr>
+      <p:sp>
+        <p:nvSpPr>
+          <p:cNvPr id="2" name="Title 1"/>
+          <p:cNvSpPr>
+            <a:spLocks noGrp="1"/>
+          </p:cNvSpPr>
+          <p:nvPr>
+            <p:ph type="title"/>
+          </p:nvPr>
+        </p:nvSpPr>
+        <p:spPr/>
+        <p:txBody>
+          <a:bodyPr/>
+          <a:lstStyle/>
+          <a:p>
+            <a:r>
+              <a:rPr lang="en-US" dirty="0" smtClean="0"/>
+              <a:t>Scalability Trilemma (</a:t>
+            </a:r>
+            <a:r>
+              <a:rPr lang="en-US" dirty="0" err="1" smtClean="0"/>
+              <a:t>contd</a:t>
+            </a:r>
+            <a:r>
+              <a:rPr lang="en-US" dirty="0" smtClean="0"/>
+              <a:t>…)</a:t>
+            </a:r>
+            <a:endParaRPr lang="en-US" dirty="0"/>
+          </a:p>
+        </p:txBody>
+      </p:sp>
+      <p:sp>
+        <p:nvSpPr>
+          <p:cNvPr id="3" name="Content Placeholder 2"/>
+          <p:cNvSpPr>
+            <a:spLocks noGrp="1"/>
+          </p:cNvSpPr>
+          <p:nvPr>
+            <p:ph idx="1"/>
+          </p:nvPr>
+        </p:nvSpPr>
+        <p:spPr/>
+        <p:txBody>
+          <a:bodyPr/>
+          <a:lstStyle/>
+          <a:p>
+            <a:r>
+              <a:rPr lang="en-US" dirty="0" smtClean="0"/>
+              <a:t>One of the     “hot”     research topic in </a:t>
+            </a:r>
+            <a:r>
+              <a:rPr lang="en-US" dirty="0" err="1" smtClean="0"/>
+              <a:t>blockchain</a:t>
+            </a:r>
+            <a:r>
+              <a:rPr lang="en-US" dirty="0" smtClean="0"/>
+              <a:t> technology</a:t>
+            </a:r>
+          </a:p>
+          <a:p>
+            <a:r>
+              <a:rPr lang="en-US" dirty="0" smtClean="0"/>
+              <a:t>Example of scalability trilemma</a:t>
+            </a:r>
+          </a:p>
+          <a:p>
+            <a:pPr lvl="1"/>
+            <a:r>
+              <a:rPr lang="en-US" dirty="0" smtClean="0"/>
+              <a:t>Bitcoin </a:t>
+            </a:r>
+            <a:r>
+              <a:rPr lang="en-US" dirty="0"/>
+              <a:t>is secure and decentralized, but not speedy.</a:t>
+            </a:r>
+          </a:p>
+          <a:p>
+            <a:pPr lvl="1"/>
+            <a:r>
+              <a:rPr lang="en-US" dirty="0" smtClean="0"/>
+              <a:t>Ripple </a:t>
+            </a:r>
+            <a:r>
+              <a:rPr lang="en-US" dirty="0"/>
+              <a:t>XRP is speedy but less secure and has limited decentralization.</a:t>
+            </a:r>
+          </a:p>
+          <a:p>
+            <a:pPr lvl="1"/>
+            <a:r>
+              <a:rPr lang="en-US" dirty="0" smtClean="0"/>
+              <a:t>EOS </a:t>
+            </a:r>
+            <a:r>
+              <a:rPr lang="en-US" dirty="0"/>
+              <a:t>is also not decentralized and is less secure, but it is speedy.</a:t>
+            </a:r>
+          </a:p>
+          <a:p>
+            <a:pPr lvl="1"/>
+            <a:r>
+              <a:rPr lang="en-US" dirty="0" err="1" smtClean="0"/>
+              <a:t>Ethereum</a:t>
+            </a:r>
+            <a:r>
+              <a:rPr lang="en-US" dirty="0" smtClean="0"/>
+              <a:t> </a:t>
+            </a:r>
+            <a:r>
+              <a:rPr lang="en-US" dirty="0"/>
+              <a:t>is secure and decentralized but not speedy.</a:t>
+            </a:r>
+          </a:p>
+          <a:p>
+            <a:pPr lvl="1"/>
             <a:endParaRPr lang="en-US" dirty="0"/>
           </a:p>
         </p:txBody>
@@ -3338,65 +4725,663 @@
           </a:stretch>
         </p:blipFill>
         <p:spPr>
-          <a:xfrm>
-            <a:off x="3282697" y="3464801"/>
-            <a:ext cx="2895152" cy="2065831"/>
+          <a:xfrm flipH="1">
+            <a:off x="2691384" y="1825625"/>
+            <a:ext cx="417576" cy="417576"/>
           </a:xfrm>
           <a:prstGeom prst="rect">
             <a:avLst/>
           </a:prstGeom>
         </p:spPr>
       </p:pic>
-      <p:sp>
-        <p:nvSpPr>
-          <p:cNvPr id="5" name="TextBox 4"/>
-          <p:cNvSpPr txBox="1"/>
+      <p:pic>
+        <p:nvPicPr>
+          <p:cNvPr id="6" name="Picture 5"/>
+          <p:cNvPicPr>
+            <a:picLocks noChangeAspect="1"/>
+          </p:cNvPicPr>
           <p:nvPr/>
-        </p:nvSpPr>
+        </p:nvPicPr>
+        <p:blipFill>
+          <a:blip r:embed="rId2" cstate="print">
+            <a:extLst>
+              <a:ext uri="{28A0092B-C50C-407E-A947-70E740481C1C}">
+                <a14:useLocalDpi xmlns:a14="http://schemas.microsoft.com/office/drawing/2010/main" val="0"/>
+              </a:ext>
+            </a:extLst>
+          </a:blip>
+          <a:stretch>
+            <a:fillRect/>
+          </a:stretch>
+        </p:blipFill>
         <p:spPr>
-          <a:xfrm>
-            <a:off x="2816352" y="5665569"/>
-            <a:ext cx="5468112" cy="646331"/>
+          <a:xfrm flipH="1">
+            <a:off x="3886200" y="1825625"/>
+            <a:ext cx="417576" cy="417576"/>
           </a:xfrm>
           <a:prstGeom prst="rect">
             <a:avLst/>
           </a:prstGeom>
-          <a:noFill/>
         </p:spPr>
-        <p:txBody>
-          <a:bodyPr wrap="square" rtlCol="0">
-            <a:spAutoFit/>
-          </a:bodyPr>
-          <a:lstStyle/>
-          <a:p>
-            <a:r>
-              <a:rPr lang="en-US" dirty="0" smtClean="0"/>
-              <a:t>Image Source- </a:t>
-            </a:r>
-            <a:r>
-              <a:rPr lang="en-US" dirty="0" smtClean="0">
-                <a:hlinkClick r:id="rId3"/>
-              </a:rPr>
-              <a:t>https://www.jeffersoncapital.info/wp-content/uploads/2018/07/The-Blockchain-Trilemma.png</a:t>
-            </a:r>
-            <a:r>
-              <a:rPr lang="en-US" dirty="0" smtClean="0"/>
-              <a:t> </a:t>
-            </a:r>
-            <a:endParaRPr lang="en-US" dirty="0"/>
-          </a:p>
-        </p:txBody>
-      </p:sp>
+      </p:pic>
     </p:spTree>
     <p:extLst>
       <p:ext uri="{BB962C8B-B14F-4D97-AF65-F5344CB8AC3E}">
-        <p14:creationId xmlns:p14="http://schemas.microsoft.com/office/powerpoint/2010/main" val="291564133"/>
+        <p14:creationId xmlns:p14="http://schemas.microsoft.com/office/powerpoint/2010/main" val="3770298653"/>
       </p:ext>
     </p:extLst>
   </p:cSld>
   <p:clrMapOvr>
     <a:masterClrMapping/>
   </p:clrMapOvr>
+  <p:timing>
+    <p:tnLst>
+      <p:par>
+        <p:cTn id="1" dur="indefinite" restart="never" nodeType="tmRoot"/>
+      </p:par>
+    </p:tnLst>
+  </p:timing>
+</p:sld>
+</file>
+
+<file path=ppt/slides/slide16.xml><?xml version="1.0" encoding="utf-8"?>
+<p:sld xmlns:a="http://schemas.openxmlformats.org/drawingml/2006/main" xmlns:r="http://schemas.openxmlformats.org/officeDocument/2006/relationships" xmlns:p="http://schemas.openxmlformats.org/presentationml/2006/main">
+  <p:cSld>
+    <p:spTree>
+      <p:nvGrpSpPr>
+        <p:cNvPr id="1" name=""/>
+        <p:cNvGrpSpPr/>
+        <p:nvPr/>
+      </p:nvGrpSpPr>
+      <p:grpSpPr>
+        <a:xfrm>
+          <a:off x="0" y="0"/>
+          <a:ext cx="0" cy="0"/>
+          <a:chOff x="0" y="0"/>
+          <a:chExt cx="0" cy="0"/>
+        </a:xfrm>
+      </p:grpSpPr>
+      <p:sp>
+        <p:nvSpPr>
+          <p:cNvPr id="2" name="Title 1"/>
+          <p:cNvSpPr>
+            <a:spLocks noGrp="1"/>
+          </p:cNvSpPr>
+          <p:nvPr>
+            <p:ph type="title"/>
+          </p:nvPr>
+        </p:nvSpPr>
+        <p:spPr/>
+        <p:txBody>
+          <a:bodyPr/>
+          <a:lstStyle/>
+          <a:p>
+            <a:r>
+              <a:rPr lang="en-US" dirty="0" smtClean="0"/>
+              <a:t>References Used</a:t>
+            </a:r>
+            <a:endParaRPr lang="en-US" dirty="0"/>
+          </a:p>
+        </p:txBody>
+      </p:sp>
+      <p:sp>
+        <p:nvSpPr>
+          <p:cNvPr id="3" name="Content Placeholder 2"/>
+          <p:cNvSpPr>
+            <a:spLocks noGrp="1"/>
+          </p:cNvSpPr>
+          <p:nvPr>
+            <p:ph idx="1"/>
+          </p:nvPr>
+        </p:nvSpPr>
+        <p:spPr/>
+        <p:txBody>
+          <a:bodyPr>
+            <a:normAutofit fontScale="70000" lnSpcReduction="20000"/>
+          </a:bodyPr>
+          <a:lstStyle/>
+          <a:p>
+            <a:r>
+              <a:rPr lang="en-US" u="sng" dirty="0" smtClean="0">
+                <a:hlinkClick r:id="rId2"/>
+              </a:rPr>
+              <a:t>https</a:t>
+            </a:r>
+            <a:r>
+              <a:rPr lang="en-US" u="sng" dirty="0">
+                <a:hlinkClick r:id="rId2"/>
+              </a:rPr>
+              <a:t>://medium.com/@bitrewards/blockchain-scalability-the-issues-and-proposed-solutions-2ec2c7ac98f0</a:t>
+            </a:r>
+            <a:r>
+              <a:rPr lang="en-US" dirty="0"/>
+              <a:t> </a:t>
+            </a:r>
+          </a:p>
+          <a:p>
+            <a:r>
+              <a:rPr lang="en-US" u="sng" dirty="0">
+                <a:hlinkClick r:id="rId3"/>
+              </a:rPr>
+              <a:t>https://blockgeeks.com/guides/blockchain-scalability/</a:t>
+            </a:r>
+            <a:endParaRPr lang="en-US" dirty="0"/>
+          </a:p>
+          <a:p>
+            <a:r>
+              <a:rPr lang="en-US" u="sng" dirty="0">
+                <a:hlinkClick r:id="rId4"/>
+              </a:rPr>
+              <a:t>https://hackernoon.com/blockchain-scalability-layer2-bitcoin-ethereum-bb34afd1f9d2</a:t>
+            </a:r>
+            <a:r>
+              <a:rPr lang="en-US" dirty="0"/>
+              <a:t> </a:t>
+            </a:r>
+          </a:p>
+          <a:p>
+            <a:r>
+              <a:rPr lang="en-US" u="sng" dirty="0">
+                <a:hlinkClick r:id="rId5"/>
+              </a:rPr>
+              <a:t>https://en.wikipedia.org/wiki/SegWit</a:t>
+            </a:r>
+            <a:endParaRPr lang="en-US" dirty="0"/>
+          </a:p>
+          <a:p>
+            <a:r>
+              <a:rPr lang="en-US" u="sng" dirty="0">
+                <a:hlinkClick r:id="rId6"/>
+              </a:rPr>
+              <a:t>https://lucidity.tech/layer-2-blockchain-technology/</a:t>
+            </a:r>
+            <a:r>
+              <a:rPr lang="en-US" dirty="0"/>
+              <a:t> </a:t>
+            </a:r>
+          </a:p>
+          <a:p>
+            <a:r>
+              <a:rPr lang="en-US" u="sng" dirty="0">
+                <a:hlinkClick r:id="rId7"/>
+              </a:rPr>
+              <a:t>https://</a:t>
+            </a:r>
+            <a:r>
+              <a:rPr lang="en-US" u="sng" dirty="0" smtClean="0">
+                <a:hlinkClick r:id="rId7"/>
+              </a:rPr>
+              <a:t>medium.com/coinmonks/sidechains-solving-the-blockchain-scaling-problem-b3847918b44</a:t>
+            </a:r>
+            <a:endParaRPr lang="en-US" u="sng" dirty="0" smtClean="0"/>
+          </a:p>
+          <a:p>
+            <a:r>
+              <a:rPr lang="en-US" dirty="0">
+                <a:hlinkClick r:id="rId8"/>
+              </a:rPr>
+              <a:t>https://</a:t>
+            </a:r>
+            <a:r>
+              <a:rPr lang="en-US" dirty="0" smtClean="0">
+                <a:hlinkClick r:id="rId8"/>
+              </a:rPr>
+              <a:t>docs.zilliqa.com/whitepaper.pdf</a:t>
+            </a:r>
+            <a:r>
+              <a:rPr lang="en-US" dirty="0" smtClean="0"/>
+              <a:t> </a:t>
+            </a:r>
+            <a:endParaRPr lang="en-US" dirty="0"/>
+          </a:p>
+          <a:p>
+            <a:r>
+              <a:rPr lang="en-US" u="sng" dirty="0">
+                <a:hlinkClick r:id="rId9"/>
+              </a:rPr>
+              <a:t>https://medium.com/edchain/what-is-sharding-in-blockchain-8afd9ed4cff0</a:t>
+            </a:r>
+            <a:r>
+              <a:rPr lang="en-US" dirty="0"/>
+              <a:t> </a:t>
+            </a:r>
+            <a:endParaRPr lang="en-US" dirty="0" smtClean="0"/>
+          </a:p>
+          <a:p>
+            <a:r>
+              <a:rPr lang="en-US" dirty="0">
+                <a:hlinkClick r:id="rId10"/>
+              </a:rPr>
+              <a:t>https://</a:t>
+            </a:r>
+            <a:r>
+              <a:rPr lang="en-US" dirty="0" smtClean="0">
+                <a:hlinkClick r:id="rId10"/>
+              </a:rPr>
+              <a:t>www.bitcoinlightning.com/wp-content/uploads/2018/03/lightning-network-paper.pdf</a:t>
+            </a:r>
+            <a:r>
+              <a:rPr lang="en-US" dirty="0" smtClean="0"/>
+              <a:t> </a:t>
+            </a:r>
+            <a:endParaRPr lang="en-US" dirty="0"/>
+          </a:p>
+          <a:p>
+            <a:r>
+              <a:rPr lang="en-US" u="sng" dirty="0">
+                <a:hlinkClick r:id="rId11"/>
+              </a:rPr>
+              <a:t>https://bitcoinmagazine.com/articles/op-ed-many-faces-sharding-blockchain-scalability/</a:t>
+            </a:r>
+            <a:r>
+              <a:rPr lang="en-US" dirty="0"/>
+              <a:t> </a:t>
+            </a:r>
+            <a:endParaRPr lang="en-US" dirty="0" smtClean="0"/>
+          </a:p>
+          <a:p>
+            <a:r>
+              <a:rPr lang="en-US" u="sng" dirty="0">
+                <a:hlinkClick r:id="rId12"/>
+              </a:rPr>
+              <a:t>https://en.wikipedia.org/wiki/Bitcoin_scalability_problem</a:t>
+            </a:r>
+            <a:endParaRPr lang="en-US" dirty="0"/>
+          </a:p>
+        </p:txBody>
+      </p:sp>
+    </p:spTree>
+    <p:extLst>
+      <p:ext uri="{BB962C8B-B14F-4D97-AF65-F5344CB8AC3E}">
+        <p14:creationId xmlns:p14="http://schemas.microsoft.com/office/powerpoint/2010/main" val="1067871646"/>
+      </p:ext>
+    </p:extLst>
+  </p:cSld>
+  <p:clrMapOvr>
+    <a:masterClrMapping/>
+  </p:clrMapOvr>
+  <p:timing>
+    <p:tnLst>
+      <p:par>
+        <p:cTn id="1" dur="indefinite" restart="never" nodeType="tmRoot"/>
+      </p:par>
+    </p:tnLst>
+  </p:timing>
+</p:sld>
+</file>
+
+<file path=ppt/slides/slide17.xml><?xml version="1.0" encoding="utf-8"?>
+<p:sld xmlns:a="http://schemas.openxmlformats.org/drawingml/2006/main" xmlns:r="http://schemas.openxmlformats.org/officeDocument/2006/relationships" xmlns:p="http://schemas.openxmlformats.org/presentationml/2006/main">
+  <p:cSld>
+    <p:spTree>
+      <p:nvGrpSpPr>
+        <p:cNvPr id="1" name=""/>
+        <p:cNvGrpSpPr/>
+        <p:nvPr/>
+      </p:nvGrpSpPr>
+      <p:grpSpPr>
+        <a:xfrm>
+          <a:off x="0" y="0"/>
+          <a:ext cx="0" cy="0"/>
+          <a:chOff x="0" y="0"/>
+          <a:chExt cx="0" cy="0"/>
+        </a:xfrm>
+      </p:grpSpPr>
+      <p:sp>
+        <p:nvSpPr>
+          <p:cNvPr id="2" name="Title 1"/>
+          <p:cNvSpPr>
+            <a:spLocks noGrp="1"/>
+          </p:cNvSpPr>
+          <p:nvPr>
+            <p:ph type="title"/>
+          </p:nvPr>
+        </p:nvSpPr>
+        <p:spPr/>
+        <p:txBody>
+          <a:bodyPr/>
+          <a:lstStyle/>
+          <a:p>
+            <a:r>
+              <a:rPr lang="en-US" dirty="0" smtClean="0"/>
+              <a:t>Q &amp; A?</a:t>
+            </a:r>
+            <a:endParaRPr lang="en-US" dirty="0"/>
+          </a:p>
+        </p:txBody>
+      </p:sp>
+      <p:pic>
+        <p:nvPicPr>
+          <p:cNvPr id="4" name="Content Placeholder 3"/>
+          <p:cNvPicPr>
+            <a:picLocks noGrp="1" noChangeAspect="1"/>
+          </p:cNvPicPr>
+          <p:nvPr>
+            <p:ph idx="1"/>
+          </p:nvPr>
+        </p:nvPicPr>
+        <p:blipFill>
+          <a:blip r:embed="rId2">
+            <a:extLst>
+              <a:ext uri="{28A0092B-C50C-407E-A947-70E740481C1C}">
+                <a14:useLocalDpi xmlns:a14="http://schemas.microsoft.com/office/drawing/2010/main" val="0"/>
+              </a:ext>
+            </a:extLst>
+          </a:blip>
+          <a:stretch>
+            <a:fillRect/>
+          </a:stretch>
+        </p:blipFill>
+        <p:spPr>
+          <a:xfrm>
+            <a:off x="3114675" y="1690688"/>
+            <a:ext cx="5962650" cy="4219575"/>
+          </a:xfrm>
+        </p:spPr>
+      </p:pic>
+    </p:spTree>
+    <p:extLst>
+      <p:ext uri="{BB962C8B-B14F-4D97-AF65-F5344CB8AC3E}">
+        <p14:creationId xmlns:p14="http://schemas.microsoft.com/office/powerpoint/2010/main" val="167366752"/>
+      </p:ext>
+    </p:extLst>
+  </p:cSld>
+  <p:clrMapOvr>
+    <a:masterClrMapping/>
+  </p:clrMapOvr>
+  <p:timing>
+    <p:tnLst>
+      <p:par>
+        <p:cTn id="1" dur="indefinite" restart="never" nodeType="tmRoot"/>
+      </p:par>
+    </p:tnLst>
+  </p:timing>
+</p:sld>
+</file>
+
+<file path=ppt/slides/slide2.xml><?xml version="1.0" encoding="utf-8"?>
+<p:sld xmlns:a="http://schemas.openxmlformats.org/drawingml/2006/main" xmlns:r="http://schemas.openxmlformats.org/officeDocument/2006/relationships" xmlns:p="http://schemas.openxmlformats.org/presentationml/2006/main">
+  <p:cSld>
+    <p:spTree>
+      <p:nvGrpSpPr>
+        <p:cNvPr id="1" name=""/>
+        <p:cNvGrpSpPr/>
+        <p:nvPr/>
+      </p:nvGrpSpPr>
+      <p:grpSpPr>
+        <a:xfrm>
+          <a:off x="0" y="0"/>
+          <a:ext cx="0" cy="0"/>
+          <a:chOff x="0" y="0"/>
+          <a:chExt cx="0" cy="0"/>
+        </a:xfrm>
+      </p:grpSpPr>
+      <p:sp>
+        <p:nvSpPr>
+          <p:cNvPr id="2" name="Title 1"/>
+          <p:cNvSpPr>
+            <a:spLocks noGrp="1"/>
+          </p:cNvSpPr>
+          <p:nvPr>
+            <p:ph type="title"/>
+          </p:nvPr>
+        </p:nvSpPr>
+        <p:spPr/>
+        <p:txBody>
+          <a:bodyPr/>
+          <a:lstStyle/>
+          <a:p>
+            <a:r>
+              <a:rPr lang="en-US" dirty="0" smtClean="0"/>
+              <a:t>Transaction Processing Speed</a:t>
+            </a:r>
+            <a:endParaRPr lang="en-US" dirty="0"/>
+          </a:p>
+        </p:txBody>
+      </p:sp>
+      <p:sp>
+        <p:nvSpPr>
+          <p:cNvPr id="3" name="Content Placeholder 2"/>
+          <p:cNvSpPr>
+            <a:spLocks noGrp="1"/>
+          </p:cNvSpPr>
+          <p:nvPr>
+            <p:ph idx="1"/>
+          </p:nvPr>
+        </p:nvSpPr>
+        <p:spPr/>
+        <p:txBody>
+          <a:bodyPr/>
+          <a:lstStyle/>
+          <a:p>
+            <a:r>
+              <a:rPr lang="en-US" dirty="0" smtClean="0"/>
+              <a:t>VISA &amp; MasterCard Payment System – 24000 TPS</a:t>
+            </a:r>
+          </a:p>
+          <a:p>
+            <a:r>
+              <a:rPr lang="en-US" dirty="0" smtClean="0"/>
+              <a:t>Bitcoin </a:t>
+            </a:r>
+            <a:r>
+              <a:rPr lang="en-US" dirty="0" err="1" smtClean="0"/>
+              <a:t>Blockchain</a:t>
+            </a:r>
+            <a:r>
+              <a:rPr lang="en-US" dirty="0" smtClean="0"/>
+              <a:t> – 3.3 to 7 TPS</a:t>
+            </a:r>
+          </a:p>
+          <a:p>
+            <a:r>
+              <a:rPr lang="en-US" dirty="0" err="1" smtClean="0"/>
+              <a:t>Ethereum</a:t>
+            </a:r>
+            <a:r>
+              <a:rPr lang="en-US" dirty="0" smtClean="0"/>
+              <a:t> </a:t>
+            </a:r>
+            <a:r>
+              <a:rPr lang="en-US" dirty="0" err="1" smtClean="0"/>
+              <a:t>Blockchain</a:t>
+            </a:r>
+            <a:r>
+              <a:rPr lang="en-US" dirty="0" smtClean="0"/>
+              <a:t> – 15 to 20 TPS</a:t>
+            </a:r>
+          </a:p>
+          <a:p>
+            <a:pPr lvl="0"/>
+            <a:endParaRPr lang="en-US" i="1" dirty="0">
+              <a:solidFill>
+                <a:prstClr val="black"/>
+              </a:solidFill>
+            </a:endParaRPr>
+          </a:p>
+          <a:p>
+            <a:pPr marL="0" indent="0">
+              <a:buNone/>
+            </a:pPr>
+            <a:endParaRPr lang="en-US" dirty="0" smtClean="0"/>
+          </a:p>
+        </p:txBody>
+      </p:sp>
+    </p:spTree>
+    <p:extLst>
+      <p:ext uri="{BB962C8B-B14F-4D97-AF65-F5344CB8AC3E}">
+        <p14:creationId xmlns:p14="http://schemas.microsoft.com/office/powerpoint/2010/main" val="3289948821"/>
+      </p:ext>
+    </p:extLst>
+  </p:cSld>
+  <p:clrMapOvr>
+    <a:masterClrMapping/>
+  </p:clrMapOvr>
+  <p:timing>
+    <p:tnLst>
+      <p:par>
+        <p:cTn id="1" dur="indefinite" restart="never" nodeType="tmRoot"/>
+      </p:par>
+    </p:tnLst>
+  </p:timing>
+</p:sld>
+</file>
+
+<file path=ppt/slides/slide3.xml><?xml version="1.0" encoding="utf-8"?>
+<p:sld xmlns:a="http://schemas.openxmlformats.org/drawingml/2006/main" xmlns:r="http://schemas.openxmlformats.org/officeDocument/2006/relationships" xmlns:p="http://schemas.openxmlformats.org/presentationml/2006/main">
+  <p:cSld>
+    <p:spTree>
+      <p:nvGrpSpPr>
+        <p:cNvPr id="1" name=""/>
+        <p:cNvGrpSpPr/>
+        <p:nvPr/>
+      </p:nvGrpSpPr>
+      <p:grpSpPr>
+        <a:xfrm>
+          <a:off x="0" y="0"/>
+          <a:ext cx="0" cy="0"/>
+          <a:chOff x="0" y="0"/>
+          <a:chExt cx="0" cy="0"/>
+        </a:xfrm>
+      </p:grpSpPr>
+      <p:sp>
+        <p:nvSpPr>
+          <p:cNvPr id="2" name="Title 1"/>
+          <p:cNvSpPr>
+            <a:spLocks noGrp="1"/>
+          </p:cNvSpPr>
+          <p:nvPr>
+            <p:ph type="title"/>
+          </p:nvPr>
+        </p:nvSpPr>
+        <p:spPr/>
+        <p:txBody>
+          <a:bodyPr/>
+          <a:lstStyle/>
+          <a:p>
+            <a:r>
+              <a:rPr lang="en-US" dirty="0" smtClean="0"/>
+              <a:t>Research Problem: The Scalability Problem?</a:t>
+            </a:r>
+            <a:endParaRPr lang="en-US" dirty="0"/>
+          </a:p>
+        </p:txBody>
+      </p:sp>
+      <p:sp>
+        <p:nvSpPr>
+          <p:cNvPr id="3" name="Content Placeholder 2"/>
+          <p:cNvSpPr>
+            <a:spLocks noGrp="1"/>
+          </p:cNvSpPr>
+          <p:nvPr>
+            <p:ph idx="1"/>
+          </p:nvPr>
+        </p:nvSpPr>
+        <p:spPr/>
+        <p:txBody>
+          <a:bodyPr>
+            <a:normAutofit/>
+          </a:bodyPr>
+          <a:lstStyle/>
+          <a:p>
+            <a:r>
+              <a:rPr lang="en-US" dirty="0" smtClean="0"/>
+              <a:t>Early design of </a:t>
+            </a:r>
+            <a:r>
+              <a:rPr lang="en-US" dirty="0" err="1" smtClean="0"/>
+              <a:t>blockchain</a:t>
+            </a:r>
+            <a:r>
+              <a:rPr lang="en-US" dirty="0" smtClean="0"/>
+              <a:t> did not consider its widespread use</a:t>
+            </a:r>
+          </a:p>
+          <a:p>
+            <a:r>
+              <a:rPr lang="en-US" dirty="0" smtClean="0"/>
+              <a:t>Interest in </a:t>
+            </a:r>
+            <a:r>
+              <a:rPr lang="en-US" dirty="0" err="1" smtClean="0"/>
+              <a:t>blockchain</a:t>
+            </a:r>
+            <a:r>
+              <a:rPr lang="en-US" dirty="0" smtClean="0"/>
+              <a:t> technology has soared with new releases of tokens, coins and </a:t>
+            </a:r>
+            <a:r>
+              <a:rPr lang="en-US" dirty="0" err="1" smtClean="0"/>
+              <a:t>Dapps</a:t>
+            </a:r>
+            <a:endParaRPr lang="en-US" dirty="0" smtClean="0"/>
+          </a:p>
+          <a:p>
+            <a:r>
+              <a:rPr lang="en-US" dirty="0" smtClean="0"/>
+              <a:t>Due to limit on transaction processing capability, increased use of </a:t>
+            </a:r>
+            <a:r>
+              <a:rPr lang="en-US" dirty="0" err="1" smtClean="0"/>
+              <a:t>blockchain</a:t>
+            </a:r>
+            <a:r>
+              <a:rPr lang="en-US" dirty="0" smtClean="0"/>
+              <a:t> applications will cause the system to crash or yield high latency</a:t>
+            </a:r>
+            <a:endParaRPr lang="en-US" i="1" dirty="0">
+              <a:solidFill>
+                <a:prstClr val="black"/>
+              </a:solidFill>
+            </a:endParaRPr>
+          </a:p>
+          <a:p>
+            <a:pPr lvl="0"/>
+            <a:r>
+              <a:rPr lang="en-US" dirty="0">
+                <a:solidFill>
+                  <a:prstClr val="black"/>
+                </a:solidFill>
+              </a:rPr>
+              <a:t>This situation can be considered as an availability (readiness for service) issue of </a:t>
+            </a:r>
+            <a:r>
+              <a:rPr lang="en-US" dirty="0" err="1">
+                <a:solidFill>
+                  <a:prstClr val="black"/>
+                </a:solidFill>
+              </a:rPr>
+              <a:t>blockchain</a:t>
+            </a:r>
+            <a:r>
+              <a:rPr lang="en-US" dirty="0">
+                <a:solidFill>
+                  <a:prstClr val="black"/>
+                </a:solidFill>
+              </a:rPr>
+              <a:t> networks. [Also concerns with security]</a:t>
+            </a:r>
+            <a:endParaRPr lang="en-US" dirty="0" smtClean="0"/>
+          </a:p>
+        </p:txBody>
+      </p:sp>
+    </p:spTree>
+    <p:extLst>
+      <p:ext uri="{BB962C8B-B14F-4D97-AF65-F5344CB8AC3E}">
+        <p14:creationId xmlns:p14="http://schemas.microsoft.com/office/powerpoint/2010/main" val="3203047306"/>
+      </p:ext>
+    </p:extLst>
+  </p:cSld>
+  <p:clrMapOvr>
+    <a:masterClrMapping/>
+  </p:clrMapOvr>
+  <p:timing>
+    <p:tnLst>
+      <p:par>
+        <p:cTn id="1" dur="indefinite" restart="never" nodeType="tmRoot"/>
+      </p:par>
+    </p:tnLst>
+  </p:timing>
 </p:sld>
 </file>
 
@@ -3434,7 +5419,7 @@
           <a:p>
             <a:r>
               <a:rPr lang="en-US" dirty="0" smtClean="0"/>
-              <a:t>The Scalability Problem?</a:t>
+              <a:t>More on The Scalability Problem</a:t>
             </a:r>
             <a:endParaRPr lang="en-US" dirty="0"/>
           </a:p>
@@ -3452,44 +5437,905 @@
         </p:nvSpPr>
         <p:spPr/>
         <p:txBody>
-          <a:bodyPr/>
-          <a:lstStyle/>
-          <a:p>
-            <a:r>
-              <a:rPr lang="en-US" dirty="0" smtClean="0"/>
-              <a:t>Early design of </a:t>
+          <a:bodyPr>
+            <a:normAutofit/>
+          </a:bodyPr>
+          <a:lstStyle/>
+          <a:p>
+            <a:r>
+              <a:rPr lang="en-US" dirty="0" smtClean="0"/>
+              <a:t>Problem of Scalability is due to</a:t>
+            </a:r>
+          </a:p>
+          <a:p>
+            <a:pPr lvl="1"/>
+            <a:r>
+              <a:rPr lang="en-US" dirty="0" smtClean="0"/>
+              <a:t>Block Size / Transaction Limits per blocks [1MB Bitcoin Block Size/ 6.7 M Gas Limit per </a:t>
             </a:r>
             <a:r>
               <a:rPr lang="en-US" dirty="0" err="1" smtClean="0"/>
-              <a:t>blockchain</a:t>
-            </a:r>
-            <a:r>
-              <a:rPr lang="en-US" dirty="0" smtClean="0"/>
-              <a:t> did not consider the widespread use</a:t>
-            </a:r>
-          </a:p>
-          <a:p>
-            <a:r>
-              <a:rPr lang="en-US" smtClean="0"/>
-              <a:t>Although </a:t>
-            </a:r>
-            <a:r>
-              <a:rPr lang="en-US" dirty="0" smtClean="0"/>
-              <a:t>cannot handle large number of </a:t>
-            </a:r>
+              <a:t>Ethereum</a:t>
+            </a:r>
+            <a:r>
+              <a:rPr lang="en-US" dirty="0" smtClean="0"/>
+              <a:t> Block]</a:t>
+            </a:r>
+          </a:p>
+          <a:p>
+            <a:pPr lvl="1"/>
+            <a:r>
+              <a:rPr lang="en-US" dirty="0" smtClean="0"/>
+              <a:t>Block Generation &amp; Confirmation Time [10mins/block requires 6 confirmations &amp; 15seconds/block requires 12 confirmations ]</a:t>
+            </a:r>
+            <a:endParaRPr lang="en-US" dirty="0"/>
+          </a:p>
+          <a:p>
+            <a:r>
+              <a:rPr lang="en-US" i="1" dirty="0">
+                <a:solidFill>
+                  <a:prstClr val="black"/>
+                </a:solidFill>
+              </a:rPr>
+              <a:t>“If you want to pay for a cup of coffee in Bitcoin/Ethers, are you willing to wait for an hour/few minutes </a:t>
+            </a:r>
+            <a:r>
+              <a:rPr lang="en-US" i="1" dirty="0" smtClean="0">
+                <a:solidFill>
+                  <a:prstClr val="black"/>
+                </a:solidFill>
+              </a:rPr>
+              <a:t>just for </a:t>
+            </a:r>
+            <a:r>
+              <a:rPr lang="en-US" i="1" dirty="0">
+                <a:solidFill>
+                  <a:prstClr val="black"/>
+                </a:solidFill>
+              </a:rPr>
+              <a:t>confirmation of transactions</a:t>
+            </a:r>
+            <a:r>
+              <a:rPr lang="en-US" i="1" dirty="0" smtClean="0">
+                <a:solidFill>
+                  <a:prstClr val="black"/>
+                </a:solidFill>
+              </a:rPr>
+              <a:t>?”</a:t>
+            </a:r>
+          </a:p>
+        </p:txBody>
+      </p:sp>
+      <p:pic>
+        <p:nvPicPr>
+          <p:cNvPr id="5" name="Picture 4"/>
+          <p:cNvPicPr>
+            <a:picLocks noChangeAspect="1"/>
+          </p:cNvPicPr>
+          <p:nvPr/>
+        </p:nvPicPr>
+        <p:blipFill>
+          <a:blip r:embed="rId2">
+            <a:extLst>
+              <a:ext uri="{28A0092B-C50C-407E-A947-70E740481C1C}">
+                <a14:useLocalDpi xmlns:a14="http://schemas.microsoft.com/office/drawing/2010/main" val="0"/>
+              </a:ext>
+            </a:extLst>
+          </a:blip>
+          <a:stretch>
+            <a:fillRect/>
+          </a:stretch>
+        </p:blipFill>
+        <p:spPr>
+          <a:xfrm>
+            <a:off x="8586978" y="4575810"/>
+            <a:ext cx="2095500" cy="2095500"/>
+          </a:xfrm>
+          <a:prstGeom prst="rect">
+            <a:avLst/>
+          </a:prstGeom>
+        </p:spPr>
+      </p:pic>
+      <p:sp>
+        <p:nvSpPr>
+          <p:cNvPr id="6" name="TextBox 5"/>
+          <p:cNvSpPr txBox="1"/>
+          <p:nvPr/>
+        </p:nvSpPr>
+        <p:spPr>
+          <a:xfrm>
+            <a:off x="1289304" y="5500807"/>
+            <a:ext cx="6702552" cy="923330"/>
+          </a:xfrm>
+          <a:prstGeom prst="rect">
+            <a:avLst/>
+          </a:prstGeom>
+          <a:noFill/>
+        </p:spPr>
+        <p:txBody>
+          <a:bodyPr wrap="square" rtlCol="0">
+            <a:spAutoFit/>
+          </a:bodyPr>
+          <a:lstStyle/>
+          <a:p>
+            <a:r>
+              <a:rPr lang="en-US" dirty="0"/>
+              <a:t>Image Courtesy: </a:t>
+            </a:r>
+            <a:r>
+              <a:rPr lang="en-US" dirty="0">
+                <a:hlinkClick r:id="rId3"/>
+              </a:rPr>
+              <a:t>https://</a:t>
+            </a:r>
+            <a:r>
+              <a:rPr lang="en-US" dirty="0" smtClean="0">
+                <a:hlinkClick r:id="rId3"/>
+              </a:rPr>
+              <a:t>media.tenor.com/images/7b1db8a92b657a9484e7bbb15d1c200b/tenor.gif</a:t>
+            </a:r>
+            <a:r>
+              <a:rPr lang="en-US" dirty="0" smtClean="0"/>
+              <a:t> </a:t>
+            </a:r>
+            <a:endParaRPr lang="en-US" dirty="0"/>
           </a:p>
         </p:txBody>
       </p:sp>
     </p:spTree>
     <p:extLst>
       <p:ext uri="{BB962C8B-B14F-4D97-AF65-F5344CB8AC3E}">
-        <p14:creationId xmlns:p14="http://schemas.microsoft.com/office/powerpoint/2010/main" val="3203047306"/>
+        <p14:creationId xmlns:p14="http://schemas.microsoft.com/office/powerpoint/2010/main" val="2875339848"/>
       </p:ext>
     </p:extLst>
   </p:cSld>
   <p:clrMapOvr>
     <a:masterClrMapping/>
   </p:clrMapOvr>
+  <p:timing>
+    <p:tnLst>
+      <p:par>
+        <p:cTn id="1" dur="indefinite" restart="never" nodeType="tmRoot"/>
+      </p:par>
+    </p:tnLst>
+  </p:timing>
+</p:sld>
+</file>
+
+<file path=ppt/slides/slide5.xml><?xml version="1.0" encoding="utf-8"?>
+<p:sld xmlns:a="http://schemas.openxmlformats.org/drawingml/2006/main" xmlns:r="http://schemas.openxmlformats.org/officeDocument/2006/relationships" xmlns:p="http://schemas.openxmlformats.org/presentationml/2006/main">
+  <p:cSld>
+    <p:spTree>
+      <p:nvGrpSpPr>
+        <p:cNvPr id="1" name=""/>
+        <p:cNvGrpSpPr/>
+        <p:nvPr/>
+      </p:nvGrpSpPr>
+      <p:grpSpPr>
+        <a:xfrm>
+          <a:off x="0" y="0"/>
+          <a:ext cx="0" cy="0"/>
+          <a:chOff x="0" y="0"/>
+          <a:chExt cx="0" cy="0"/>
+        </a:xfrm>
+      </p:grpSpPr>
+      <p:sp>
+        <p:nvSpPr>
+          <p:cNvPr id="2" name="Title 1"/>
+          <p:cNvSpPr>
+            <a:spLocks noGrp="1"/>
+          </p:cNvSpPr>
+          <p:nvPr>
+            <p:ph type="title"/>
+          </p:nvPr>
+        </p:nvSpPr>
+        <p:spPr/>
+        <p:txBody>
+          <a:bodyPr/>
+          <a:lstStyle/>
+          <a:p>
+            <a:r>
+              <a:rPr lang="en-US" dirty="0" smtClean="0"/>
+              <a:t>Proposal</a:t>
+            </a:r>
+            <a:endParaRPr lang="en-US" dirty="0"/>
+          </a:p>
+        </p:txBody>
+      </p:sp>
+      <p:sp>
+        <p:nvSpPr>
+          <p:cNvPr id="3" name="Content Placeholder 2"/>
+          <p:cNvSpPr>
+            <a:spLocks noGrp="1"/>
+          </p:cNvSpPr>
+          <p:nvPr>
+            <p:ph idx="1"/>
+          </p:nvPr>
+        </p:nvSpPr>
+        <p:spPr/>
+        <p:txBody>
+          <a:bodyPr/>
+          <a:lstStyle/>
+          <a:p>
+            <a:r>
+              <a:rPr lang="en-US" dirty="0" smtClean="0"/>
+              <a:t>Research and explore on the existing proposed solutions to </a:t>
+            </a:r>
+            <a:r>
+              <a:rPr lang="en-US" dirty="0" err="1" smtClean="0"/>
+              <a:t>Scalabality</a:t>
+            </a:r>
+            <a:endParaRPr lang="en-US" dirty="0" smtClean="0"/>
+          </a:p>
+          <a:p>
+            <a:r>
+              <a:rPr lang="en-US" dirty="0" smtClean="0"/>
+              <a:t>Design/model a solution to the </a:t>
+            </a:r>
+            <a:r>
+              <a:rPr lang="en-US" dirty="0" err="1" smtClean="0"/>
+              <a:t>blockchain</a:t>
+            </a:r>
+            <a:r>
+              <a:rPr lang="en-US" dirty="0" smtClean="0"/>
+              <a:t> scalability problem</a:t>
+            </a:r>
+            <a:endParaRPr lang="en-US" dirty="0"/>
+          </a:p>
+        </p:txBody>
+      </p:sp>
+    </p:spTree>
+    <p:extLst>
+      <p:ext uri="{BB962C8B-B14F-4D97-AF65-F5344CB8AC3E}">
+        <p14:creationId xmlns:p14="http://schemas.microsoft.com/office/powerpoint/2010/main" val="730294370"/>
+      </p:ext>
+    </p:extLst>
+  </p:cSld>
+  <p:clrMapOvr>
+    <a:masterClrMapping/>
+  </p:clrMapOvr>
+  <p:timing>
+    <p:tnLst>
+      <p:par>
+        <p:cTn id="1" dur="indefinite" restart="never" nodeType="tmRoot"/>
+      </p:par>
+    </p:tnLst>
+  </p:timing>
+</p:sld>
+</file>
+
+<file path=ppt/slides/slide6.xml><?xml version="1.0" encoding="utf-8"?>
+<p:sld xmlns:a="http://schemas.openxmlformats.org/drawingml/2006/main" xmlns:r="http://schemas.openxmlformats.org/officeDocument/2006/relationships" xmlns:p="http://schemas.openxmlformats.org/presentationml/2006/main">
+  <p:cSld>
+    <p:spTree>
+      <p:nvGrpSpPr>
+        <p:cNvPr id="1" name=""/>
+        <p:cNvGrpSpPr/>
+        <p:nvPr/>
+      </p:nvGrpSpPr>
+      <p:grpSpPr>
+        <a:xfrm>
+          <a:off x="0" y="0"/>
+          <a:ext cx="0" cy="0"/>
+          <a:chOff x="0" y="0"/>
+          <a:chExt cx="0" cy="0"/>
+        </a:xfrm>
+      </p:grpSpPr>
+      <p:sp>
+        <p:nvSpPr>
+          <p:cNvPr id="2" name="Title 1"/>
+          <p:cNvSpPr>
+            <a:spLocks noGrp="1"/>
+          </p:cNvSpPr>
+          <p:nvPr>
+            <p:ph type="title"/>
+          </p:nvPr>
+        </p:nvSpPr>
+        <p:spPr/>
+        <p:txBody>
+          <a:bodyPr/>
+          <a:lstStyle/>
+          <a:p>
+            <a:r>
+              <a:rPr lang="en-US" dirty="0" smtClean="0"/>
+              <a:t>Existing Proposed Solutions</a:t>
+            </a:r>
+            <a:endParaRPr lang="en-US" dirty="0"/>
+          </a:p>
+        </p:txBody>
+      </p:sp>
+      <p:sp>
+        <p:nvSpPr>
+          <p:cNvPr id="3" name="Content Placeholder 2"/>
+          <p:cNvSpPr>
+            <a:spLocks noGrp="1"/>
+          </p:cNvSpPr>
+          <p:nvPr>
+            <p:ph idx="1"/>
+          </p:nvPr>
+        </p:nvSpPr>
+        <p:spPr/>
+        <p:txBody>
+          <a:bodyPr/>
+          <a:lstStyle/>
+          <a:p>
+            <a:r>
+              <a:rPr lang="en-US" dirty="0" smtClean="0"/>
+              <a:t>Layer 1 solutions</a:t>
+            </a:r>
+          </a:p>
+          <a:p>
+            <a:pPr lvl="1"/>
+            <a:r>
+              <a:rPr lang="en-US" dirty="0"/>
+              <a:t>Forking – change/update to the </a:t>
+            </a:r>
+            <a:r>
+              <a:rPr lang="en-US" dirty="0" err="1"/>
+              <a:t>blockchain</a:t>
+            </a:r>
+            <a:r>
+              <a:rPr lang="en-US" dirty="0"/>
+              <a:t> protocols or divergence from the previous version of </a:t>
+            </a:r>
+            <a:r>
+              <a:rPr lang="en-US" dirty="0" err="1" smtClean="0"/>
+              <a:t>blockchain</a:t>
+            </a:r>
+            <a:endParaRPr lang="en-US" dirty="0" smtClean="0"/>
+          </a:p>
+          <a:p>
+            <a:pPr lvl="1"/>
+            <a:r>
+              <a:rPr lang="en-US" dirty="0" err="1" smtClean="0"/>
+              <a:t>Eg</a:t>
+            </a:r>
+            <a:r>
+              <a:rPr lang="en-US" dirty="0" smtClean="0"/>
+              <a:t>. Block Size Increase, Change of Consensus Algorithms – </a:t>
+            </a:r>
+            <a:r>
+              <a:rPr lang="en-US" dirty="0" err="1" smtClean="0"/>
+              <a:t>PoW</a:t>
+            </a:r>
+            <a:r>
+              <a:rPr lang="en-US" dirty="0" smtClean="0"/>
+              <a:t> to </a:t>
+            </a:r>
+            <a:r>
+              <a:rPr lang="en-US" dirty="0" err="1" smtClean="0"/>
+              <a:t>DPoS</a:t>
+            </a:r>
+            <a:r>
+              <a:rPr lang="en-US" dirty="0" smtClean="0"/>
+              <a:t>, </a:t>
+            </a:r>
+            <a:r>
+              <a:rPr lang="en-US" dirty="0" err="1" smtClean="0"/>
+              <a:t>Sharding</a:t>
+            </a:r>
+            <a:endParaRPr lang="en-US" dirty="0"/>
+          </a:p>
+          <a:p>
+            <a:r>
+              <a:rPr lang="en-US" dirty="0" smtClean="0"/>
+              <a:t>Layer 2 solutions</a:t>
+            </a:r>
+          </a:p>
+          <a:p>
+            <a:pPr lvl="1"/>
+            <a:r>
+              <a:rPr lang="en-US" dirty="0" smtClean="0"/>
+              <a:t>Doesn’t require forking, as changes only made to the layer above base layer</a:t>
+            </a:r>
+          </a:p>
+          <a:p>
+            <a:pPr lvl="1"/>
+            <a:r>
+              <a:rPr lang="en-US" dirty="0" smtClean="0"/>
+              <a:t>Another layer that operates on top of secured base layer of </a:t>
+            </a:r>
+            <a:r>
+              <a:rPr lang="en-US" dirty="0" err="1" smtClean="0"/>
+              <a:t>blockchain</a:t>
+            </a:r>
+            <a:endParaRPr lang="en-US" dirty="0" smtClean="0"/>
+          </a:p>
+          <a:p>
+            <a:pPr lvl="1"/>
+            <a:r>
+              <a:rPr lang="en-US" dirty="0" err="1"/>
+              <a:t>e</a:t>
+            </a:r>
+            <a:r>
+              <a:rPr lang="en-US" dirty="0" err="1" smtClean="0"/>
+              <a:t>g</a:t>
+            </a:r>
+            <a:r>
+              <a:rPr lang="en-US" dirty="0" smtClean="0"/>
+              <a:t>. Off-chain, Side-chain</a:t>
+            </a:r>
+            <a:endParaRPr lang="en-US" dirty="0"/>
+          </a:p>
+        </p:txBody>
+      </p:sp>
+    </p:spTree>
+    <p:extLst>
+      <p:ext uri="{BB962C8B-B14F-4D97-AF65-F5344CB8AC3E}">
+        <p14:creationId xmlns:p14="http://schemas.microsoft.com/office/powerpoint/2010/main" val="2643526232"/>
+      </p:ext>
+    </p:extLst>
+  </p:cSld>
+  <p:clrMapOvr>
+    <a:masterClrMapping/>
+  </p:clrMapOvr>
+  <p:timing>
+    <p:tnLst>
+      <p:par>
+        <p:cTn id="1" dur="indefinite" restart="never" nodeType="tmRoot"/>
+      </p:par>
+    </p:tnLst>
+  </p:timing>
+</p:sld>
+</file>
+
+<file path=ppt/slides/slide7.xml><?xml version="1.0" encoding="utf-8"?>
+<p:sld xmlns:a="http://schemas.openxmlformats.org/drawingml/2006/main" xmlns:r="http://schemas.openxmlformats.org/officeDocument/2006/relationships" xmlns:p="http://schemas.openxmlformats.org/presentationml/2006/main">
+  <p:cSld>
+    <p:spTree>
+      <p:nvGrpSpPr>
+        <p:cNvPr id="1" name=""/>
+        <p:cNvGrpSpPr/>
+        <p:nvPr/>
+      </p:nvGrpSpPr>
+      <p:grpSpPr>
+        <a:xfrm>
+          <a:off x="0" y="0"/>
+          <a:ext cx="0" cy="0"/>
+          <a:chOff x="0" y="0"/>
+          <a:chExt cx="0" cy="0"/>
+        </a:xfrm>
+      </p:grpSpPr>
+      <p:sp>
+        <p:nvSpPr>
+          <p:cNvPr id="2" name="Title 1"/>
+          <p:cNvSpPr>
+            <a:spLocks noGrp="1"/>
+          </p:cNvSpPr>
+          <p:nvPr>
+            <p:ph type="title"/>
+          </p:nvPr>
+        </p:nvSpPr>
+        <p:spPr/>
+        <p:txBody>
+          <a:bodyPr/>
+          <a:lstStyle/>
+          <a:p>
+            <a:r>
+              <a:rPr lang="en-US" dirty="0" smtClean="0"/>
+              <a:t>Layer 1 Solutions - Block Size Increase</a:t>
+            </a:r>
+            <a:endParaRPr lang="en-US" dirty="0"/>
+          </a:p>
+        </p:txBody>
+      </p:sp>
+      <p:sp>
+        <p:nvSpPr>
+          <p:cNvPr id="3" name="Content Placeholder 2"/>
+          <p:cNvSpPr>
+            <a:spLocks noGrp="1"/>
+          </p:cNvSpPr>
+          <p:nvPr>
+            <p:ph idx="1"/>
+          </p:nvPr>
+        </p:nvSpPr>
+        <p:spPr/>
+        <p:txBody>
+          <a:bodyPr/>
+          <a:lstStyle/>
+          <a:p>
+            <a:r>
+              <a:rPr lang="en-US" dirty="0" smtClean="0"/>
+              <a:t>Initial block size of 1MB in Bitcoin was used to prevent spam transactions in network</a:t>
+            </a:r>
+          </a:p>
+          <a:p>
+            <a:r>
+              <a:rPr lang="en-US" dirty="0" smtClean="0"/>
+              <a:t>Using Segregated Witness (a soft-fork for change in transaction format), more number of transactions could be added</a:t>
+            </a:r>
+          </a:p>
+          <a:p>
+            <a:r>
+              <a:rPr lang="en-US" dirty="0" smtClean="0"/>
+              <a:t>Vertical Scaling solutions</a:t>
+            </a:r>
+          </a:p>
+          <a:p>
+            <a:r>
+              <a:rPr lang="en-US" dirty="0" err="1" smtClean="0"/>
+              <a:t>Eg</a:t>
+            </a:r>
+            <a:r>
+              <a:rPr lang="en-US" dirty="0" smtClean="0"/>
+              <a:t>. Bitcoin Classic- block size increased to 4MB with 8000 transactions per block</a:t>
+            </a:r>
+          </a:p>
+          <a:p>
+            <a:r>
+              <a:rPr lang="en-US" dirty="0" smtClean="0"/>
+              <a:t> More work done by each node =&gt; Favors Powerful Nodes =&gt; Centralization</a:t>
+            </a:r>
+          </a:p>
+          <a:p>
+            <a:endParaRPr lang="en-US" dirty="0"/>
+          </a:p>
+        </p:txBody>
+      </p:sp>
+    </p:spTree>
+    <p:extLst>
+      <p:ext uri="{BB962C8B-B14F-4D97-AF65-F5344CB8AC3E}">
+        <p14:creationId xmlns:p14="http://schemas.microsoft.com/office/powerpoint/2010/main" val="4272097020"/>
+      </p:ext>
+    </p:extLst>
+  </p:cSld>
+  <p:clrMapOvr>
+    <a:masterClrMapping/>
+  </p:clrMapOvr>
+  <p:timing>
+    <p:tnLst>
+      <p:par>
+        <p:cTn id="1" dur="indefinite" restart="never" nodeType="tmRoot"/>
+      </p:par>
+    </p:tnLst>
+  </p:timing>
+</p:sld>
+</file>
+
+<file path=ppt/slides/slide8.xml><?xml version="1.0" encoding="utf-8"?>
+<p:sld xmlns:a="http://schemas.openxmlformats.org/drawingml/2006/main" xmlns:r="http://schemas.openxmlformats.org/officeDocument/2006/relationships" xmlns:p="http://schemas.openxmlformats.org/presentationml/2006/main">
+  <p:cSld>
+    <p:spTree>
+      <p:nvGrpSpPr>
+        <p:cNvPr id="1" name=""/>
+        <p:cNvGrpSpPr/>
+        <p:nvPr/>
+      </p:nvGrpSpPr>
+      <p:grpSpPr>
+        <a:xfrm>
+          <a:off x="0" y="0"/>
+          <a:ext cx="0" cy="0"/>
+          <a:chOff x="0" y="0"/>
+          <a:chExt cx="0" cy="0"/>
+        </a:xfrm>
+      </p:grpSpPr>
+      <p:sp>
+        <p:nvSpPr>
+          <p:cNvPr id="2" name="Title 1"/>
+          <p:cNvSpPr>
+            <a:spLocks noGrp="1"/>
+          </p:cNvSpPr>
+          <p:nvPr>
+            <p:ph type="title"/>
+          </p:nvPr>
+        </p:nvSpPr>
+        <p:spPr/>
+        <p:txBody>
+          <a:bodyPr/>
+          <a:lstStyle/>
+          <a:p>
+            <a:r>
+              <a:rPr lang="en-US" dirty="0" smtClean="0"/>
+              <a:t>Layer 1 Solutions - Change of Consensus Algorithm</a:t>
+            </a:r>
+            <a:endParaRPr lang="en-US" dirty="0"/>
+          </a:p>
+        </p:txBody>
+      </p:sp>
+      <p:sp>
+        <p:nvSpPr>
+          <p:cNvPr id="3" name="Content Placeholder 2"/>
+          <p:cNvSpPr>
+            <a:spLocks noGrp="1"/>
+          </p:cNvSpPr>
+          <p:nvPr>
+            <p:ph idx="1"/>
+          </p:nvPr>
+        </p:nvSpPr>
+        <p:spPr/>
+        <p:txBody>
+          <a:bodyPr>
+            <a:normAutofit fontScale="92500"/>
+          </a:bodyPr>
+          <a:lstStyle/>
+          <a:p>
+            <a:r>
+              <a:rPr lang="en-US" dirty="0" smtClean="0"/>
+              <a:t>Bitcoin &amp; </a:t>
+            </a:r>
+            <a:r>
+              <a:rPr lang="en-US" dirty="0" err="1" smtClean="0"/>
+              <a:t>Ethereum</a:t>
+            </a:r>
+            <a:r>
+              <a:rPr lang="en-US" dirty="0" smtClean="0"/>
+              <a:t> currently employ Proof of Work consensus algorithms</a:t>
+            </a:r>
+          </a:p>
+          <a:p>
+            <a:r>
+              <a:rPr lang="en-US" dirty="0" smtClean="0"/>
+              <a:t>In </a:t>
+            </a:r>
+            <a:r>
+              <a:rPr lang="en-US" dirty="0" err="1" smtClean="0"/>
+              <a:t>PoW</a:t>
+            </a:r>
+            <a:r>
+              <a:rPr lang="en-US" dirty="0" smtClean="0"/>
+              <a:t>, any node can participate without having anything at stake</a:t>
+            </a:r>
+          </a:p>
+          <a:p>
+            <a:pPr lvl="1"/>
+            <a:r>
+              <a:rPr lang="en-US" dirty="0" smtClean="0"/>
+              <a:t>Consensus is more difficult to achieve as the size of nodes/network increases</a:t>
+            </a:r>
+          </a:p>
+          <a:p>
+            <a:pPr lvl="1"/>
+            <a:r>
+              <a:rPr lang="en-US" dirty="0" smtClean="0"/>
+              <a:t>Can cause delay in transaction confirmation</a:t>
+            </a:r>
+          </a:p>
+          <a:p>
+            <a:pPr lvl="1"/>
+            <a:r>
+              <a:rPr lang="en-US" dirty="0"/>
+              <a:t>Participation of every participating node in transaction validation makes the transaction process slower.</a:t>
+            </a:r>
+            <a:endParaRPr lang="en-US" b="1" dirty="0" smtClean="0"/>
+          </a:p>
+          <a:p>
+            <a:r>
+              <a:rPr lang="en-US" dirty="0" smtClean="0"/>
+              <a:t>In </a:t>
+            </a:r>
+            <a:r>
+              <a:rPr lang="en-US" dirty="0" err="1" smtClean="0"/>
+              <a:t>PoS</a:t>
+            </a:r>
+            <a:r>
+              <a:rPr lang="en-US" dirty="0" smtClean="0"/>
+              <a:t>/</a:t>
+            </a:r>
+            <a:r>
+              <a:rPr lang="en-US" dirty="0" err="1" smtClean="0"/>
+              <a:t>DPoS</a:t>
+            </a:r>
+            <a:r>
+              <a:rPr lang="en-US" dirty="0" smtClean="0"/>
+              <a:t>, nodes stake their assets to participate in mining</a:t>
+            </a:r>
+          </a:p>
+          <a:p>
+            <a:pPr lvl="1"/>
+            <a:r>
+              <a:rPr lang="en-US" dirty="0" smtClean="0"/>
+              <a:t>Easier to reach consensus as there is a smaller no. of delegates/stakeholders</a:t>
+            </a:r>
+          </a:p>
+          <a:p>
+            <a:pPr lvl="1"/>
+            <a:r>
+              <a:rPr lang="en-US" dirty="0" smtClean="0"/>
+              <a:t>Results in faster block generation and confirmation</a:t>
+            </a:r>
+          </a:p>
+          <a:p>
+            <a:pPr lvl="1"/>
+            <a:r>
+              <a:rPr lang="en-US" dirty="0" smtClean="0"/>
+              <a:t>Semi-centralized</a:t>
+            </a:r>
+          </a:p>
+          <a:p>
+            <a:pPr lvl="1"/>
+            <a:r>
+              <a:rPr lang="en-US" dirty="0" err="1"/>
+              <a:t>e</a:t>
+            </a:r>
+            <a:r>
+              <a:rPr lang="en-US" dirty="0" err="1" smtClean="0"/>
+              <a:t>g</a:t>
+            </a:r>
+            <a:r>
+              <a:rPr lang="en-US" dirty="0" smtClean="0"/>
+              <a:t>. EOS (21 block producers / 3000 TPS)</a:t>
+            </a:r>
+            <a:endParaRPr lang="en-US" dirty="0"/>
+          </a:p>
+        </p:txBody>
+      </p:sp>
+    </p:spTree>
+    <p:extLst>
+      <p:ext uri="{BB962C8B-B14F-4D97-AF65-F5344CB8AC3E}">
+        <p14:creationId xmlns:p14="http://schemas.microsoft.com/office/powerpoint/2010/main" val="826020201"/>
+      </p:ext>
+    </p:extLst>
+  </p:cSld>
+  <p:clrMapOvr>
+    <a:masterClrMapping/>
+  </p:clrMapOvr>
+  <p:timing>
+    <p:tnLst>
+      <p:par>
+        <p:cTn id="1" dur="indefinite" restart="never" nodeType="tmRoot"/>
+      </p:par>
+    </p:tnLst>
+  </p:timing>
+</p:sld>
+</file>
+
+<file path=ppt/slides/slide9.xml><?xml version="1.0" encoding="utf-8"?>
+<p:sld xmlns:a="http://schemas.openxmlformats.org/drawingml/2006/main" xmlns:r="http://schemas.openxmlformats.org/officeDocument/2006/relationships" xmlns:p="http://schemas.openxmlformats.org/presentationml/2006/main">
+  <p:cSld>
+    <p:spTree>
+      <p:nvGrpSpPr>
+        <p:cNvPr id="1" name=""/>
+        <p:cNvGrpSpPr/>
+        <p:nvPr/>
+      </p:nvGrpSpPr>
+      <p:grpSpPr>
+        <a:xfrm>
+          <a:off x="0" y="0"/>
+          <a:ext cx="0" cy="0"/>
+          <a:chOff x="0" y="0"/>
+          <a:chExt cx="0" cy="0"/>
+        </a:xfrm>
+      </p:grpSpPr>
+      <p:sp>
+        <p:nvSpPr>
+          <p:cNvPr id="2" name="Title 1"/>
+          <p:cNvSpPr>
+            <a:spLocks noGrp="1"/>
+          </p:cNvSpPr>
+          <p:nvPr>
+            <p:ph type="title"/>
+          </p:nvPr>
+        </p:nvSpPr>
+        <p:spPr/>
+        <p:txBody>
+          <a:bodyPr/>
+          <a:lstStyle/>
+          <a:p>
+            <a:r>
+              <a:rPr lang="en-US" dirty="0" smtClean="0"/>
+              <a:t>Layer 1 Solutions – </a:t>
+            </a:r>
+            <a:r>
+              <a:rPr lang="en-US" dirty="0" err="1" smtClean="0"/>
+              <a:t>Sharding</a:t>
+            </a:r>
+            <a:endParaRPr lang="en-US" dirty="0"/>
+          </a:p>
+        </p:txBody>
+      </p:sp>
+      <p:sp>
+        <p:nvSpPr>
+          <p:cNvPr id="3" name="Content Placeholder 2"/>
+          <p:cNvSpPr>
+            <a:spLocks noGrp="1"/>
+          </p:cNvSpPr>
+          <p:nvPr>
+            <p:ph idx="1"/>
+          </p:nvPr>
+        </p:nvSpPr>
+        <p:spPr/>
+        <p:txBody>
+          <a:bodyPr/>
+          <a:lstStyle/>
+          <a:p>
+            <a:r>
+              <a:rPr lang="en-US" dirty="0"/>
+              <a:t>Shards </a:t>
+            </a:r>
+            <a:r>
+              <a:rPr lang="en-US" dirty="0" smtClean="0"/>
+              <a:t>– a piece or fragment</a:t>
+            </a:r>
+          </a:p>
+          <a:p>
+            <a:r>
+              <a:rPr lang="en-US" dirty="0" smtClean="0"/>
+              <a:t>Using </a:t>
+            </a:r>
+            <a:r>
+              <a:rPr lang="en-US" dirty="0" err="1" smtClean="0"/>
+              <a:t>Sharding</a:t>
+            </a:r>
+            <a:r>
+              <a:rPr lang="en-US" dirty="0" smtClean="0"/>
+              <a:t>, each node will only store a  part of the data on the </a:t>
+            </a:r>
+            <a:r>
+              <a:rPr lang="en-US" dirty="0" err="1" smtClean="0"/>
+              <a:t>blockchain</a:t>
+            </a:r>
+            <a:r>
+              <a:rPr lang="en-US" dirty="0" smtClean="0"/>
+              <a:t> and not the entire information</a:t>
+            </a:r>
+          </a:p>
+          <a:p>
+            <a:r>
+              <a:rPr lang="en-US" dirty="0" smtClean="0"/>
+              <a:t>Involves splitting a </a:t>
+            </a:r>
+            <a:r>
+              <a:rPr lang="en-US" dirty="0" err="1" smtClean="0"/>
+              <a:t>blockchain</a:t>
+            </a:r>
+            <a:r>
+              <a:rPr lang="en-US" dirty="0" smtClean="0"/>
+              <a:t> into different sections called shards, each of which can independently process transactions</a:t>
+            </a:r>
+          </a:p>
+          <a:p>
+            <a:r>
+              <a:rPr lang="en-US" dirty="0" smtClean="0"/>
+              <a:t>Requires Proof of Stake consensus algorithm</a:t>
+            </a:r>
+          </a:p>
+          <a:p>
+            <a:r>
+              <a:rPr lang="en-US" dirty="0" smtClean="0"/>
+              <a:t>Horizontal scaling </a:t>
+            </a:r>
+            <a:r>
+              <a:rPr lang="en-US" dirty="0"/>
+              <a:t>solution i.e</a:t>
+            </a:r>
+            <a:r>
+              <a:rPr lang="en-US" dirty="0" smtClean="0"/>
+              <a:t>. </a:t>
+            </a:r>
+            <a:r>
+              <a:rPr lang="en-US" dirty="0"/>
+              <a:t>throughput increases as the mining network expands</a:t>
+            </a:r>
+            <a:endParaRPr lang="en-US" dirty="0" smtClean="0"/>
+          </a:p>
+          <a:p>
+            <a:r>
+              <a:rPr lang="en-US" dirty="0" smtClean="0"/>
+              <a:t>Improves transaction throughput</a:t>
+            </a:r>
+          </a:p>
+          <a:p>
+            <a:endParaRPr lang="en-US" dirty="0"/>
+          </a:p>
+        </p:txBody>
+      </p:sp>
+    </p:spTree>
+    <p:extLst>
+      <p:ext uri="{BB962C8B-B14F-4D97-AF65-F5344CB8AC3E}">
+        <p14:creationId xmlns:p14="http://schemas.microsoft.com/office/powerpoint/2010/main" val="2791159375"/>
+      </p:ext>
+    </p:extLst>
+  </p:cSld>
+  <p:clrMapOvr>
+    <a:masterClrMapping/>
+  </p:clrMapOvr>
+  <p:timing>
+    <p:tnLst>
+      <p:par>
+        <p:cTn id="1" dur="indefinite" restart="never" nodeType="tmRoot"/>
+      </p:par>
+    </p:tnLst>
+  </p:timing>
 </p:sld>
 </file>
 
@@ -3752,4 +6598,265 @@
     </a:ext>
   </a:extLst>
 </a:theme>
+</file>
+
+<file path=ppt/theme/theme2.xml><?xml version="1.0" encoding="utf-8"?>
+<a:theme xmlns:a="http://schemas.openxmlformats.org/drawingml/2006/main" name="Office Theme">
+  <a:themeElements>
+    <a:clrScheme name="Office">
+      <a:dk1>
+        <a:sysClr val="windowText" lastClr="000000"/>
+      </a:dk1>
+      <a:lt1>
+        <a:sysClr val="window" lastClr="FFFFFF"/>
+      </a:lt1>
+      <a:dk2>
+        <a:srgbClr val="44546A"/>
+      </a:dk2>
+      <a:lt2>
+        <a:srgbClr val="E7E6E6"/>
+      </a:lt2>
+      <a:accent1>
+        <a:srgbClr val="5B9BD5"/>
+      </a:accent1>
+      <a:accent2>
+        <a:srgbClr val="ED7D31"/>
+      </a:accent2>
+      <a:accent3>
+        <a:srgbClr val="A5A5A5"/>
+      </a:accent3>
+      <a:accent4>
+        <a:srgbClr val="FFC000"/>
+      </a:accent4>
+      <a:accent5>
+        <a:srgbClr val="4472C4"/>
+      </a:accent5>
+      <a:accent6>
+        <a:srgbClr val="70AD47"/>
+      </a:accent6>
+      <a:hlink>
+        <a:srgbClr val="0563C1"/>
+      </a:hlink>
+      <a:folHlink>
+        <a:srgbClr val="954F72"/>
+      </a:folHlink>
+    </a:clrScheme>
+    <a:fontScheme name="Office">
+      <a:majorFont>
+        <a:latin typeface="Calibri Light" panose="020F0302020204030204"/>
+        <a:ea typeface=""/>
+        <a:cs typeface=""/>
+        <a:font script="Jpan" typeface="游ゴシック Light"/>
+        <a:font script="Hang" typeface="맑은 고딕"/>
+        <a:font script="Hans" typeface="等线 Light"/>
+        <a:font script="Hant" typeface="新細明體"/>
+        <a:font script="Arab" typeface="Times New Roman"/>
+        <a:font script="Hebr" typeface="Times New Roman"/>
+        <a:font script="Thai" typeface="Angsana New"/>
+        <a:font script="Ethi" typeface="Nyala"/>
+        <a:font script="Beng" typeface="Vrinda"/>
+        <a:font script="Gujr" typeface="Shruti"/>
+        <a:font script="Khmr" typeface="MoolBoran"/>
+        <a:font script="Knda" typeface="Tunga"/>
+        <a:font script="Guru" typeface="Raavi"/>
+        <a:font script="Cans" typeface="Euphemia"/>
+        <a:font script="Cher" typeface="Plantagenet Cherokee"/>
+        <a:font script="Yiii" typeface="Microsoft Yi Baiti"/>
+        <a:font script="Tibt" typeface="Microsoft Himalaya"/>
+        <a:font script="Thaa" typeface="MV Boli"/>
+        <a:font script="Deva" typeface="Mangal"/>
+        <a:font script="Telu" typeface="Gautami"/>
+        <a:font script="Taml" typeface="Latha"/>
+        <a:font script="Syrc" typeface="Estrangelo Edessa"/>
+        <a:font script="Orya" typeface="Kalinga"/>
+        <a:font script="Mlym" typeface="Kartika"/>
+        <a:font script="Laoo" typeface="DokChampa"/>
+        <a:font script="Sinh" typeface="Iskoola Pota"/>
+        <a:font script="Mong" typeface="Mongolian Baiti"/>
+        <a:font script="Viet" typeface="Times New Roman"/>
+        <a:font script="Uigh" typeface="Microsoft Uighur"/>
+        <a:font script="Geor" typeface="Sylfaen"/>
+      </a:majorFont>
+      <a:minorFont>
+        <a:latin typeface="Calibri" panose="020F0502020204030204"/>
+        <a:ea typeface=""/>
+        <a:cs typeface=""/>
+        <a:font script="Jpan" typeface="游ゴシック"/>
+        <a:font script="Hang" typeface="맑은 고딕"/>
+        <a:font script="Hans" typeface="等线"/>
+        <a:font script="Hant" typeface="新細明體"/>
+        <a:font script="Arab" typeface="Arial"/>
+        <a:font script="Hebr" typeface="Arial"/>
+        <a:font script="Thai" typeface="Cordia New"/>
+        <a:font script="Ethi" typeface="Nyala"/>
+        <a:font script="Beng" typeface="Vrinda"/>
+        <a:font script="Gujr" typeface="Shruti"/>
+        <a:font script="Khmr" typeface="DaunPenh"/>
+        <a:font script="Knda" typeface="Tunga"/>
+        <a:font script="Guru" typeface="Raavi"/>
+        <a:font script="Cans" typeface="Euphemia"/>
+        <a:font script="Cher" typeface="Plantagenet Cherokee"/>
+        <a:font script="Yiii" typeface="Microsoft Yi Baiti"/>
+        <a:font script="Tibt" typeface="Microsoft Himalaya"/>
+        <a:font script="Thaa" typeface="MV Boli"/>
+        <a:font script="Deva" typeface="Mangal"/>
+        <a:font script="Telu" typeface="Gautami"/>
+        <a:font script="Taml" typeface="Latha"/>
+        <a:font script="Syrc" typeface="Estrangelo Edessa"/>
+        <a:font script="Orya" typeface="Kalinga"/>
+        <a:font script="Mlym" typeface="Kartika"/>
+        <a:font script="Laoo" typeface="DokChampa"/>
+        <a:font script="Sinh" typeface="Iskoola Pota"/>
+        <a:font script="Mong" typeface="Mongolian Baiti"/>
+        <a:font script="Viet" typeface="Arial"/>
+        <a:font script="Uigh" typeface="Microsoft Uighur"/>
+        <a:font script="Geor" typeface="Sylfaen"/>
+      </a:minorFont>
+    </a:fontScheme>
+    <a:fmtScheme name="Office">
+      <a:fillStyleLst>
+        <a:solidFill>
+          <a:schemeClr val="phClr"/>
+        </a:solidFill>
+        <a:gradFill rotWithShape="1">
+          <a:gsLst>
+            <a:gs pos="0">
+              <a:schemeClr val="phClr">
+                <a:lumMod val="110000"/>
+                <a:satMod val="105000"/>
+                <a:tint val="67000"/>
+              </a:schemeClr>
+            </a:gs>
+            <a:gs pos="50000">
+              <a:schemeClr val="phClr">
+                <a:lumMod val="105000"/>
+                <a:satMod val="103000"/>
+                <a:tint val="73000"/>
+              </a:schemeClr>
+            </a:gs>
+            <a:gs pos="100000">
+              <a:schemeClr val="phClr">
+                <a:lumMod val="105000"/>
+                <a:satMod val="109000"/>
+                <a:tint val="81000"/>
+              </a:schemeClr>
+            </a:gs>
+          </a:gsLst>
+          <a:lin ang="5400000" scaled="0"/>
+        </a:gradFill>
+        <a:gradFill rotWithShape="1">
+          <a:gsLst>
+            <a:gs pos="0">
+              <a:schemeClr val="phClr">
+                <a:satMod val="103000"/>
+                <a:lumMod val="102000"/>
+                <a:tint val="94000"/>
+              </a:schemeClr>
+            </a:gs>
+            <a:gs pos="50000">
+              <a:schemeClr val="phClr">
+                <a:satMod val="110000"/>
+                <a:lumMod val="100000"/>
+                <a:shade val="100000"/>
+              </a:schemeClr>
+            </a:gs>
+            <a:gs pos="100000">
+              <a:schemeClr val="phClr">
+                <a:lumMod val="99000"/>
+                <a:satMod val="120000"/>
+                <a:shade val="78000"/>
+              </a:schemeClr>
+            </a:gs>
+          </a:gsLst>
+          <a:lin ang="5400000" scaled="0"/>
+        </a:gradFill>
+      </a:fillStyleLst>
+      <a:lnStyleLst>
+        <a:ln w="6350" cap="flat" cmpd="sng" algn="ctr">
+          <a:solidFill>
+            <a:schemeClr val="phClr"/>
+          </a:solidFill>
+          <a:prstDash val="solid"/>
+          <a:miter lim="800000"/>
+        </a:ln>
+        <a:ln w="12700" cap="flat" cmpd="sng" algn="ctr">
+          <a:solidFill>
+            <a:schemeClr val="phClr"/>
+          </a:solidFill>
+          <a:prstDash val="solid"/>
+          <a:miter lim="800000"/>
+        </a:ln>
+        <a:ln w="19050" cap="flat" cmpd="sng" algn="ctr">
+          <a:solidFill>
+            <a:schemeClr val="phClr"/>
+          </a:solidFill>
+          <a:prstDash val="solid"/>
+          <a:miter lim="800000"/>
+        </a:ln>
+      </a:lnStyleLst>
+      <a:effectStyleLst>
+        <a:effectStyle>
+          <a:effectLst/>
+        </a:effectStyle>
+        <a:effectStyle>
+          <a:effectLst/>
+        </a:effectStyle>
+        <a:effectStyle>
+          <a:effectLst>
+            <a:outerShdw blurRad="57150" dist="19050" dir="5400000" algn="ctr" rotWithShape="0">
+              <a:srgbClr val="000000">
+                <a:alpha val="63000"/>
+              </a:srgbClr>
+            </a:outerShdw>
+          </a:effectLst>
+        </a:effectStyle>
+      </a:effectStyleLst>
+      <a:bgFillStyleLst>
+        <a:solidFill>
+          <a:schemeClr val="phClr"/>
+        </a:solidFill>
+        <a:solidFill>
+          <a:schemeClr val="phClr">
+            <a:tint val="95000"/>
+            <a:satMod val="170000"/>
+          </a:schemeClr>
+        </a:solidFill>
+        <a:gradFill rotWithShape="1">
+          <a:gsLst>
+            <a:gs pos="0">
+              <a:schemeClr val="phClr">
+                <a:tint val="93000"/>
+                <a:satMod val="150000"/>
+                <a:shade val="98000"/>
+                <a:lumMod val="102000"/>
+              </a:schemeClr>
+            </a:gs>
+            <a:gs pos="50000">
+              <a:schemeClr val="phClr">
+                <a:tint val="98000"/>
+                <a:satMod val="130000"/>
+                <a:shade val="90000"/>
+                <a:lumMod val="103000"/>
+              </a:schemeClr>
+            </a:gs>
+            <a:gs pos="100000">
+              <a:schemeClr val="phClr">
+                <a:shade val="63000"/>
+                <a:satMod val="120000"/>
+              </a:schemeClr>
+            </a:gs>
+          </a:gsLst>
+          <a:lin ang="5400000" scaled="0"/>
+        </a:gradFill>
+      </a:bgFillStyleLst>
+    </a:fmtScheme>
+  </a:themeElements>
+  <a:objectDefaults/>
+  <a:extraClrSchemeLst/>
+  <a:extLst>
+    <a:ext uri="{05A4C25C-085E-4340-85A3-A5531E510DB2}">
+      <thm15:themeFamily xmlns:thm15="http://schemas.microsoft.com/office/thememl/2012/main" name="Office Theme" id="{62F939B6-93AF-4DB8-9C6B-D6C7DFDC589F}" vid="{4A3C46E8-61CC-4603-A589-7422A47A8E4A}"/>
+    </a:ext>
+  </a:extLst>
+</a:theme>
 </file>
</xml_diff>